<commit_message>
Api service improvements: changed to typed service client
</commit_message>
<xml_diff>
--- a/WebUI/wwwroot/files/Generic API Project Structure v1.pptx
+++ b/WebUI/wwwroot/files/Generic API Project Structure v1.pptx
@@ -2,7 +2,7 @@
 <file path=ppt/presentation.xml><?xml version="1.0" encoding="utf-8"?>
 <p:presentation xmlns:a="http://schemas.openxmlformats.org/drawingml/2006/main" xmlns:r="http://schemas.openxmlformats.org/officeDocument/2006/relationships" xmlns:p="http://schemas.openxmlformats.org/presentationml/2006/main" saveSubsetFonts="1">
   <p:sldMasterIdLst>
-    <p:sldMasterId id="2147483660" r:id="rId1"/>
+    <p:sldMasterId id="2147483720" r:id="rId1"/>
   </p:sldMasterIdLst>
   <p:notesMasterIdLst>
     <p:notesMasterId r:id="rId3"/>
@@ -10,7 +10,7 @@
   <p:sldIdLst>
     <p:sldId id="256" r:id="rId2"/>
   </p:sldIdLst>
-  <p:sldSz cx="7772400" cy="4572000"/>
+  <p:sldSz cx="5943600" cy="2286000"/>
   <p:notesSz cx="6858000" cy="9144000"/>
   <p:defaultTextStyle>
     <a:defPPr>
@@ -197,7 +197,7 @@
           <a:p>
             <a:fld id="{C17708FB-6734-4D33-820E-5E5E652ACAA2}" type="datetimeFigureOut">
               <a:rPr lang="tr-TR" smtClean="0"/>
-              <a:t>1.09.2019</a:t>
+              <a:t>9.09.2019</a:t>
             </a:fld>
             <a:endParaRPr lang="tr-TR"/>
           </a:p>
@@ -215,8 +215,8 @@
         </p:nvSpPr>
         <p:spPr>
           <a:xfrm>
-            <a:off x="806450" y="1143000"/>
-            <a:ext cx="5245100" cy="3086100"/>
+            <a:off x="-582613" y="1143000"/>
+            <a:ext cx="8023226" cy="3086100"/>
           </a:xfrm>
           <a:prstGeom prst="rect">
             <a:avLst/>
@@ -492,7 +492,12 @@
             <p:ph type="sldImg"/>
           </p:nvPr>
         </p:nvSpPr>
-        <p:spPr/>
+        <p:spPr>
+          <a:xfrm>
+            <a:off x="-582613" y="1143000"/>
+            <a:ext cx="8023226" cy="3086100"/>
+          </a:xfrm>
+        </p:spPr>
       </p:sp>
       <p:sp>
         <p:nvSpPr>
@@ -602,20 +607,20 @@
         </p:nvSpPr>
         <p:spPr>
           <a:xfrm>
-            <a:off x="971550" y="748242"/>
-            <a:ext cx="5829300" cy="1591733"/>
+            <a:off x="742950" y="374121"/>
+            <a:ext cx="4457700" cy="795867"/>
           </a:xfrm>
         </p:spPr>
         <p:txBody>
           <a:bodyPr anchor="b"/>
           <a:lstStyle>
             <a:lvl1pPr algn="ctr">
-              <a:defRPr sz="3825"/>
+              <a:defRPr sz="2000"/>
             </a:lvl1pPr>
           </a:lstStyle>
           <a:p>
             <a:r>
-              <a:rPr lang="en-US"/>
+              <a:rPr lang="en-US" smtClean="0"/>
               <a:t>Click to edit Master title style</a:t>
             </a:r>
             <a:endParaRPr lang="en-US" dirty="0"/>
@@ -634,8 +639,8 @@
         </p:nvSpPr>
         <p:spPr>
           <a:xfrm>
-            <a:off x="971550" y="2401359"/>
-            <a:ext cx="5829300" cy="1103841"/>
+            <a:off x="742950" y="1200679"/>
+            <a:ext cx="4457700" cy="551921"/>
           </a:xfrm>
         </p:spPr>
         <p:txBody>
@@ -643,44 +648,44 @@
           <a:lstStyle>
             <a:lvl1pPr marL="0" indent="0" algn="ctr">
               <a:buNone/>
-              <a:defRPr sz="1530"/>
+              <a:defRPr sz="800"/>
             </a:lvl1pPr>
-            <a:lvl2pPr marL="291465" indent="0" algn="ctr">
-              <a:buNone/>
-              <a:defRPr sz="1275"/>
+            <a:lvl2pPr marL="152385" indent="0" algn="ctr">
+              <a:buNone/>
+              <a:defRPr sz="667"/>
             </a:lvl2pPr>
-            <a:lvl3pPr marL="582930" indent="0" algn="ctr">
-              <a:buNone/>
-              <a:defRPr sz="1148"/>
+            <a:lvl3pPr marL="304770" indent="0" algn="ctr">
+              <a:buNone/>
+              <a:defRPr sz="600"/>
             </a:lvl3pPr>
-            <a:lvl4pPr marL="874395" indent="0" algn="ctr">
-              <a:buNone/>
-              <a:defRPr sz="1020"/>
+            <a:lvl4pPr marL="457154" indent="0" algn="ctr">
+              <a:buNone/>
+              <a:defRPr sz="533"/>
             </a:lvl4pPr>
-            <a:lvl5pPr marL="1165860" indent="0" algn="ctr">
-              <a:buNone/>
-              <a:defRPr sz="1020"/>
+            <a:lvl5pPr marL="609539" indent="0" algn="ctr">
+              <a:buNone/>
+              <a:defRPr sz="533"/>
             </a:lvl5pPr>
-            <a:lvl6pPr marL="1457325" indent="0" algn="ctr">
-              <a:buNone/>
-              <a:defRPr sz="1020"/>
+            <a:lvl6pPr marL="761924" indent="0" algn="ctr">
+              <a:buNone/>
+              <a:defRPr sz="533"/>
             </a:lvl6pPr>
-            <a:lvl7pPr marL="1748790" indent="0" algn="ctr">
-              <a:buNone/>
-              <a:defRPr sz="1020"/>
+            <a:lvl7pPr marL="914309" indent="0" algn="ctr">
+              <a:buNone/>
+              <a:defRPr sz="533"/>
             </a:lvl7pPr>
-            <a:lvl8pPr marL="2040255" indent="0" algn="ctr">
-              <a:buNone/>
-              <a:defRPr sz="1020"/>
+            <a:lvl8pPr marL="1066693" indent="0" algn="ctr">
+              <a:buNone/>
+              <a:defRPr sz="533"/>
             </a:lvl8pPr>
-            <a:lvl9pPr marL="2331720" indent="0" algn="ctr">
-              <a:buNone/>
-              <a:defRPr sz="1020"/>
+            <a:lvl9pPr marL="1219078" indent="0" algn="ctr">
+              <a:buNone/>
+              <a:defRPr sz="533"/>
             </a:lvl9pPr>
           </a:lstStyle>
           <a:p>
             <a:r>
-              <a:rPr lang="en-US"/>
+              <a:rPr lang="en-US" smtClean="0"/>
               <a:t>Click to edit Master subtitle style</a:t>
             </a:r>
             <a:endParaRPr lang="en-US" dirty="0"/>
@@ -704,7 +709,7 @@
           <a:p>
             <a:fld id="{555CB1E9-1B70-44A6-BC16-8CF25AACBDAA}" type="datetimeFigureOut">
               <a:rPr lang="tr-TR" smtClean="0"/>
-              <a:t>1.09.2019</a:t>
+              <a:t>9.09.2019</a:t>
             </a:fld>
             <a:endParaRPr lang="tr-TR"/>
           </a:p>
@@ -755,7 +760,7 @@
     </p:spTree>
     <p:extLst>
       <p:ext uri="{BB962C8B-B14F-4D97-AF65-F5344CB8AC3E}">
-        <p14:creationId xmlns:p14="http://schemas.microsoft.com/office/powerpoint/2010/main" val="484560154"/>
+        <p14:creationId xmlns:p14="http://schemas.microsoft.com/office/powerpoint/2010/main" val="3655798850"/>
       </p:ext>
     </p:extLst>
   </p:cSld>
@@ -798,7 +803,7 @@
           <a:lstStyle/>
           <a:p>
             <a:r>
-              <a:rPr lang="en-US"/>
+              <a:rPr lang="en-US" smtClean="0"/>
               <a:t>Click to edit Master title style</a:t>
             </a:r>
             <a:endParaRPr lang="en-US" dirty="0"/>
@@ -822,35 +827,35 @@
           <a:p>
             <a:pPr lvl="0"/>
             <a:r>
-              <a:rPr lang="en-US"/>
-              <a:t>Click to edit Master text styles</a:t>
+              <a:rPr lang="en-US" smtClean="0"/>
+              <a:t>Edit Master text styles</a:t>
             </a:r>
           </a:p>
           <a:p>
             <a:pPr lvl="1"/>
             <a:r>
-              <a:rPr lang="en-US"/>
+              <a:rPr lang="en-US" smtClean="0"/>
               <a:t>Second level</a:t>
             </a:r>
           </a:p>
           <a:p>
             <a:pPr lvl="2"/>
             <a:r>
-              <a:rPr lang="en-US"/>
+              <a:rPr lang="en-US" smtClean="0"/>
               <a:t>Third level</a:t>
             </a:r>
           </a:p>
           <a:p>
             <a:pPr lvl="3"/>
             <a:r>
-              <a:rPr lang="en-US"/>
+              <a:rPr lang="en-US" smtClean="0"/>
               <a:t>Fourth level</a:t>
             </a:r>
           </a:p>
           <a:p>
             <a:pPr lvl="4"/>
             <a:r>
-              <a:rPr lang="en-US"/>
+              <a:rPr lang="en-US" smtClean="0"/>
               <a:t>Fifth level</a:t>
             </a:r>
             <a:endParaRPr lang="en-US" dirty="0"/>
@@ -874,7 +879,7 @@
           <a:p>
             <a:fld id="{555CB1E9-1B70-44A6-BC16-8CF25AACBDAA}" type="datetimeFigureOut">
               <a:rPr lang="tr-TR" smtClean="0"/>
-              <a:t>1.09.2019</a:t>
+              <a:t>9.09.2019</a:t>
             </a:fld>
             <a:endParaRPr lang="tr-TR"/>
           </a:p>
@@ -925,7 +930,7 @@
     </p:spTree>
     <p:extLst>
       <p:ext uri="{BB962C8B-B14F-4D97-AF65-F5344CB8AC3E}">
-        <p14:creationId xmlns:p14="http://schemas.microsoft.com/office/powerpoint/2010/main" val="1410374591"/>
+        <p14:creationId xmlns:p14="http://schemas.microsoft.com/office/powerpoint/2010/main" val="3731427664"/>
       </p:ext>
     </p:extLst>
   </p:cSld>
@@ -964,8 +969,8 @@
         </p:nvSpPr>
         <p:spPr>
           <a:xfrm>
-            <a:off x="5562124" y="243417"/>
-            <a:ext cx="1675924" cy="3874559"/>
+            <a:off x="4253389" y="121709"/>
+            <a:ext cx="1281589" cy="1937279"/>
           </a:xfrm>
         </p:spPr>
         <p:txBody>
@@ -973,7 +978,7 @@
           <a:lstStyle/>
           <a:p>
             <a:r>
-              <a:rPr lang="en-US"/>
+              <a:rPr lang="en-US" smtClean="0"/>
               <a:t>Click to edit Master title style</a:t>
             </a:r>
             <a:endParaRPr lang="en-US" dirty="0"/>
@@ -992,8 +997,8 @@
         </p:nvSpPr>
         <p:spPr>
           <a:xfrm>
-            <a:off x="534353" y="243417"/>
-            <a:ext cx="4930616" cy="3874559"/>
+            <a:off x="408623" y="121709"/>
+            <a:ext cx="3770471" cy="1937279"/>
           </a:xfrm>
         </p:spPr>
         <p:txBody>
@@ -1002,35 +1007,35 @@
           <a:p>
             <a:pPr lvl="0"/>
             <a:r>
-              <a:rPr lang="en-US"/>
-              <a:t>Click to edit Master text styles</a:t>
+              <a:rPr lang="en-US" smtClean="0"/>
+              <a:t>Edit Master text styles</a:t>
             </a:r>
           </a:p>
           <a:p>
             <a:pPr lvl="1"/>
             <a:r>
-              <a:rPr lang="en-US"/>
+              <a:rPr lang="en-US" smtClean="0"/>
               <a:t>Second level</a:t>
             </a:r>
           </a:p>
           <a:p>
             <a:pPr lvl="2"/>
             <a:r>
-              <a:rPr lang="en-US"/>
+              <a:rPr lang="en-US" smtClean="0"/>
               <a:t>Third level</a:t>
             </a:r>
           </a:p>
           <a:p>
             <a:pPr lvl="3"/>
             <a:r>
-              <a:rPr lang="en-US"/>
+              <a:rPr lang="en-US" smtClean="0"/>
               <a:t>Fourth level</a:t>
             </a:r>
           </a:p>
           <a:p>
             <a:pPr lvl="4"/>
             <a:r>
-              <a:rPr lang="en-US"/>
+              <a:rPr lang="en-US" smtClean="0"/>
               <a:t>Fifth level</a:t>
             </a:r>
             <a:endParaRPr lang="en-US" dirty="0"/>
@@ -1054,7 +1059,7 @@
           <a:p>
             <a:fld id="{555CB1E9-1B70-44A6-BC16-8CF25AACBDAA}" type="datetimeFigureOut">
               <a:rPr lang="tr-TR" smtClean="0"/>
-              <a:t>1.09.2019</a:t>
+              <a:t>9.09.2019</a:t>
             </a:fld>
             <a:endParaRPr lang="tr-TR"/>
           </a:p>
@@ -1105,7 +1110,7 @@
     </p:spTree>
     <p:extLst>
       <p:ext uri="{BB962C8B-B14F-4D97-AF65-F5344CB8AC3E}">
-        <p14:creationId xmlns:p14="http://schemas.microsoft.com/office/powerpoint/2010/main" val="4170893034"/>
+        <p14:creationId xmlns:p14="http://schemas.microsoft.com/office/powerpoint/2010/main" val="3097801994"/>
       </p:ext>
     </p:extLst>
   </p:cSld>
@@ -1148,7 +1153,7 @@
           <a:lstStyle/>
           <a:p>
             <a:r>
-              <a:rPr lang="en-US"/>
+              <a:rPr lang="en-US" smtClean="0"/>
               <a:t>Click to edit Master title style</a:t>
             </a:r>
             <a:endParaRPr lang="en-US" dirty="0"/>
@@ -1172,35 +1177,35 @@
           <a:p>
             <a:pPr lvl="0"/>
             <a:r>
-              <a:rPr lang="en-US"/>
-              <a:t>Click to edit Master text styles</a:t>
+              <a:rPr lang="en-US" smtClean="0"/>
+              <a:t>Edit Master text styles</a:t>
             </a:r>
           </a:p>
           <a:p>
             <a:pPr lvl="1"/>
             <a:r>
-              <a:rPr lang="en-US"/>
+              <a:rPr lang="en-US" smtClean="0"/>
               <a:t>Second level</a:t>
             </a:r>
           </a:p>
           <a:p>
             <a:pPr lvl="2"/>
             <a:r>
-              <a:rPr lang="en-US"/>
+              <a:rPr lang="en-US" smtClean="0"/>
               <a:t>Third level</a:t>
             </a:r>
           </a:p>
           <a:p>
             <a:pPr lvl="3"/>
             <a:r>
-              <a:rPr lang="en-US"/>
+              <a:rPr lang="en-US" smtClean="0"/>
               <a:t>Fourth level</a:t>
             </a:r>
           </a:p>
           <a:p>
             <a:pPr lvl="4"/>
             <a:r>
-              <a:rPr lang="en-US"/>
+              <a:rPr lang="en-US" smtClean="0"/>
               <a:t>Fifth level</a:t>
             </a:r>
             <a:endParaRPr lang="en-US" dirty="0"/>
@@ -1224,7 +1229,7 @@
           <a:p>
             <a:fld id="{555CB1E9-1B70-44A6-BC16-8CF25AACBDAA}" type="datetimeFigureOut">
               <a:rPr lang="tr-TR" smtClean="0"/>
-              <a:t>1.09.2019</a:t>
+              <a:t>9.09.2019</a:t>
             </a:fld>
             <a:endParaRPr lang="tr-TR"/>
           </a:p>
@@ -1275,7 +1280,7 @@
     </p:spTree>
     <p:extLst>
       <p:ext uri="{BB962C8B-B14F-4D97-AF65-F5344CB8AC3E}">
-        <p14:creationId xmlns:p14="http://schemas.microsoft.com/office/powerpoint/2010/main" val="3612539889"/>
+        <p14:creationId xmlns:p14="http://schemas.microsoft.com/office/powerpoint/2010/main" val="2249291676"/>
       </p:ext>
     </p:extLst>
   </p:cSld>
@@ -1314,20 +1319,20 @@
         </p:nvSpPr>
         <p:spPr>
           <a:xfrm>
-            <a:off x="530304" y="1139826"/>
-            <a:ext cx="6703695" cy="1901825"/>
+            <a:off x="405527" y="569913"/>
+            <a:ext cx="5126355" cy="950912"/>
           </a:xfrm>
         </p:spPr>
         <p:txBody>
           <a:bodyPr anchor="b"/>
           <a:lstStyle>
             <a:lvl1pPr>
-              <a:defRPr sz="3825"/>
+              <a:defRPr sz="2000"/>
             </a:lvl1pPr>
           </a:lstStyle>
           <a:p>
             <a:r>
-              <a:rPr lang="en-US"/>
+              <a:rPr lang="en-US" smtClean="0"/>
               <a:t>Click to edit Master title style</a:t>
             </a:r>
             <a:endParaRPr lang="en-US" dirty="0"/>
@@ -1346,8 +1351,8 @@
         </p:nvSpPr>
         <p:spPr>
           <a:xfrm>
-            <a:off x="530304" y="3059642"/>
-            <a:ext cx="6703695" cy="1000125"/>
+            <a:off x="405527" y="1529821"/>
+            <a:ext cx="5126355" cy="500062"/>
           </a:xfrm>
         </p:spPr>
         <p:txBody>
@@ -1355,7 +1360,7 @@
           <a:lstStyle>
             <a:lvl1pPr marL="0" indent="0">
               <a:buNone/>
-              <a:defRPr sz="1530">
+              <a:defRPr sz="800">
                 <a:solidFill>
                   <a:schemeClr val="tx1">
                     <a:tint val="75000"/>
@@ -1363,9 +1368,9 @@
                 </a:solidFill>
               </a:defRPr>
             </a:lvl1pPr>
-            <a:lvl2pPr marL="291465" indent="0">
-              <a:buNone/>
-              <a:defRPr sz="1275">
+            <a:lvl2pPr marL="152385" indent="0">
+              <a:buNone/>
+              <a:defRPr sz="667">
                 <a:solidFill>
                   <a:schemeClr val="tx1">
                     <a:tint val="75000"/>
@@ -1373,9 +1378,9 @@
                 </a:solidFill>
               </a:defRPr>
             </a:lvl2pPr>
-            <a:lvl3pPr marL="582930" indent="0">
-              <a:buNone/>
-              <a:defRPr sz="1148">
+            <a:lvl3pPr marL="304770" indent="0">
+              <a:buNone/>
+              <a:defRPr sz="600">
                 <a:solidFill>
                   <a:schemeClr val="tx1">
                     <a:tint val="75000"/>
@@ -1383,9 +1388,9 @@
                 </a:solidFill>
               </a:defRPr>
             </a:lvl3pPr>
-            <a:lvl4pPr marL="874395" indent="0">
-              <a:buNone/>
-              <a:defRPr sz="1020">
+            <a:lvl4pPr marL="457154" indent="0">
+              <a:buNone/>
+              <a:defRPr sz="533">
                 <a:solidFill>
                   <a:schemeClr val="tx1">
                     <a:tint val="75000"/>
@@ -1393,9 +1398,9 @@
                 </a:solidFill>
               </a:defRPr>
             </a:lvl4pPr>
-            <a:lvl5pPr marL="1165860" indent="0">
-              <a:buNone/>
-              <a:defRPr sz="1020">
+            <a:lvl5pPr marL="609539" indent="0">
+              <a:buNone/>
+              <a:defRPr sz="533">
                 <a:solidFill>
                   <a:schemeClr val="tx1">
                     <a:tint val="75000"/>
@@ -1403,9 +1408,9 @@
                 </a:solidFill>
               </a:defRPr>
             </a:lvl5pPr>
-            <a:lvl6pPr marL="1457325" indent="0">
-              <a:buNone/>
-              <a:defRPr sz="1020">
+            <a:lvl6pPr marL="761924" indent="0">
+              <a:buNone/>
+              <a:defRPr sz="533">
                 <a:solidFill>
                   <a:schemeClr val="tx1">
                     <a:tint val="75000"/>
@@ -1413,9 +1418,9 @@
                 </a:solidFill>
               </a:defRPr>
             </a:lvl6pPr>
-            <a:lvl7pPr marL="1748790" indent="0">
-              <a:buNone/>
-              <a:defRPr sz="1020">
+            <a:lvl7pPr marL="914309" indent="0">
+              <a:buNone/>
+              <a:defRPr sz="533">
                 <a:solidFill>
                   <a:schemeClr val="tx1">
                     <a:tint val="75000"/>
@@ -1423,9 +1428,9 @@
                 </a:solidFill>
               </a:defRPr>
             </a:lvl7pPr>
-            <a:lvl8pPr marL="2040255" indent="0">
-              <a:buNone/>
-              <a:defRPr sz="1020">
+            <a:lvl8pPr marL="1066693" indent="0">
+              <a:buNone/>
+              <a:defRPr sz="533">
                 <a:solidFill>
                   <a:schemeClr val="tx1">
                     <a:tint val="75000"/>
@@ -1433,9 +1438,9 @@
                 </a:solidFill>
               </a:defRPr>
             </a:lvl8pPr>
-            <a:lvl9pPr marL="2331720" indent="0">
-              <a:buNone/>
-              <a:defRPr sz="1020">
+            <a:lvl9pPr marL="1219078" indent="0">
+              <a:buNone/>
+              <a:defRPr sz="533">
                 <a:solidFill>
                   <a:schemeClr val="tx1">
                     <a:tint val="75000"/>
@@ -1447,8 +1452,8 @@
           <a:p>
             <a:pPr lvl="0"/>
             <a:r>
-              <a:rPr lang="en-US"/>
-              <a:t>Click to edit Master text styles</a:t>
+              <a:rPr lang="en-US" smtClean="0"/>
+              <a:t>Edit Master text styles</a:t>
             </a:r>
           </a:p>
         </p:txBody>
@@ -1470,7 +1475,7 @@
           <a:p>
             <a:fld id="{555CB1E9-1B70-44A6-BC16-8CF25AACBDAA}" type="datetimeFigureOut">
               <a:rPr lang="tr-TR" smtClean="0"/>
-              <a:t>1.09.2019</a:t>
+              <a:t>9.09.2019</a:t>
             </a:fld>
             <a:endParaRPr lang="tr-TR"/>
           </a:p>
@@ -1521,7 +1526,7 @@
     </p:spTree>
     <p:extLst>
       <p:ext uri="{BB962C8B-B14F-4D97-AF65-F5344CB8AC3E}">
-        <p14:creationId xmlns:p14="http://schemas.microsoft.com/office/powerpoint/2010/main" val="4203356902"/>
+        <p14:creationId xmlns:p14="http://schemas.microsoft.com/office/powerpoint/2010/main" val="256584302"/>
       </p:ext>
     </p:extLst>
   </p:cSld>
@@ -1564,7 +1569,7 @@
           <a:lstStyle/>
           <a:p>
             <a:r>
-              <a:rPr lang="en-US"/>
+              <a:rPr lang="en-US" smtClean="0"/>
               <a:t>Click to edit Master title style</a:t>
             </a:r>
             <a:endParaRPr lang="en-US" dirty="0"/>
@@ -1583,8 +1588,8 @@
         </p:nvSpPr>
         <p:spPr>
           <a:xfrm>
-            <a:off x="534353" y="1217083"/>
-            <a:ext cx="3303270" cy="2900892"/>
+            <a:off x="408623" y="608542"/>
+            <a:ext cx="2526030" cy="1450446"/>
           </a:xfrm>
         </p:spPr>
         <p:txBody>
@@ -1593,35 +1598,35 @@
           <a:p>
             <a:pPr lvl="0"/>
             <a:r>
-              <a:rPr lang="en-US"/>
-              <a:t>Click to edit Master text styles</a:t>
+              <a:rPr lang="en-US" smtClean="0"/>
+              <a:t>Edit Master text styles</a:t>
             </a:r>
           </a:p>
           <a:p>
             <a:pPr lvl="1"/>
             <a:r>
-              <a:rPr lang="en-US"/>
+              <a:rPr lang="en-US" smtClean="0"/>
               <a:t>Second level</a:t>
             </a:r>
           </a:p>
           <a:p>
             <a:pPr lvl="2"/>
             <a:r>
-              <a:rPr lang="en-US"/>
+              <a:rPr lang="en-US" smtClean="0"/>
               <a:t>Third level</a:t>
             </a:r>
           </a:p>
           <a:p>
             <a:pPr lvl="3"/>
             <a:r>
-              <a:rPr lang="en-US"/>
+              <a:rPr lang="en-US" smtClean="0"/>
               <a:t>Fourth level</a:t>
             </a:r>
           </a:p>
           <a:p>
             <a:pPr lvl="4"/>
             <a:r>
-              <a:rPr lang="en-US"/>
+              <a:rPr lang="en-US" smtClean="0"/>
               <a:t>Fifth level</a:t>
             </a:r>
             <a:endParaRPr lang="en-US" dirty="0"/>
@@ -1640,8 +1645,8 @@
         </p:nvSpPr>
         <p:spPr>
           <a:xfrm>
-            <a:off x="3934778" y="1217083"/>
-            <a:ext cx="3303270" cy="2900892"/>
+            <a:off x="3008948" y="608542"/>
+            <a:ext cx="2526030" cy="1450446"/>
           </a:xfrm>
         </p:spPr>
         <p:txBody>
@@ -1650,35 +1655,35 @@
           <a:p>
             <a:pPr lvl="0"/>
             <a:r>
-              <a:rPr lang="en-US"/>
-              <a:t>Click to edit Master text styles</a:t>
+              <a:rPr lang="en-US" smtClean="0"/>
+              <a:t>Edit Master text styles</a:t>
             </a:r>
           </a:p>
           <a:p>
             <a:pPr lvl="1"/>
             <a:r>
-              <a:rPr lang="en-US"/>
+              <a:rPr lang="en-US" smtClean="0"/>
               <a:t>Second level</a:t>
             </a:r>
           </a:p>
           <a:p>
             <a:pPr lvl="2"/>
             <a:r>
-              <a:rPr lang="en-US"/>
+              <a:rPr lang="en-US" smtClean="0"/>
               <a:t>Third level</a:t>
             </a:r>
           </a:p>
           <a:p>
             <a:pPr lvl="3"/>
             <a:r>
-              <a:rPr lang="en-US"/>
+              <a:rPr lang="en-US" smtClean="0"/>
               <a:t>Fourth level</a:t>
             </a:r>
           </a:p>
           <a:p>
             <a:pPr lvl="4"/>
             <a:r>
-              <a:rPr lang="en-US"/>
+              <a:rPr lang="en-US" smtClean="0"/>
               <a:t>Fifth level</a:t>
             </a:r>
             <a:endParaRPr lang="en-US" dirty="0"/>
@@ -1702,7 +1707,7 @@
           <a:p>
             <a:fld id="{555CB1E9-1B70-44A6-BC16-8CF25AACBDAA}" type="datetimeFigureOut">
               <a:rPr lang="tr-TR" smtClean="0"/>
-              <a:t>1.09.2019</a:t>
+              <a:t>9.09.2019</a:t>
             </a:fld>
             <a:endParaRPr lang="tr-TR"/>
           </a:p>
@@ -1753,7 +1758,7 @@
     </p:spTree>
     <p:extLst>
       <p:ext uri="{BB962C8B-B14F-4D97-AF65-F5344CB8AC3E}">
-        <p14:creationId xmlns:p14="http://schemas.microsoft.com/office/powerpoint/2010/main" val="475675278"/>
+        <p14:creationId xmlns:p14="http://schemas.microsoft.com/office/powerpoint/2010/main" val="757440480"/>
       </p:ext>
     </p:extLst>
   </p:cSld>
@@ -1792,8 +1797,8 @@
         </p:nvSpPr>
         <p:spPr>
           <a:xfrm>
-            <a:off x="535365" y="243417"/>
-            <a:ext cx="6703695" cy="883709"/>
+            <a:off x="409397" y="121709"/>
+            <a:ext cx="5126355" cy="441854"/>
           </a:xfrm>
         </p:spPr>
         <p:txBody>
@@ -1801,7 +1806,7 @@
           <a:lstStyle/>
           <a:p>
             <a:r>
-              <a:rPr lang="en-US"/>
+              <a:rPr lang="en-US" smtClean="0"/>
               <a:t>Click to edit Master title style</a:t>
             </a:r>
             <a:endParaRPr lang="en-US" dirty="0"/>
@@ -1820,8 +1825,8 @@
         </p:nvSpPr>
         <p:spPr>
           <a:xfrm>
-            <a:off x="535365" y="1120775"/>
-            <a:ext cx="3288089" cy="549275"/>
+            <a:off x="409397" y="560388"/>
+            <a:ext cx="2514421" cy="274637"/>
           </a:xfrm>
         </p:spPr>
         <p:txBody>
@@ -1829,46 +1834,46 @@
           <a:lstStyle>
             <a:lvl1pPr marL="0" indent="0">
               <a:buNone/>
-              <a:defRPr sz="1530" b="1"/>
+              <a:defRPr sz="800" b="1"/>
             </a:lvl1pPr>
-            <a:lvl2pPr marL="291465" indent="0">
-              <a:buNone/>
-              <a:defRPr sz="1275" b="1"/>
+            <a:lvl2pPr marL="152385" indent="0">
+              <a:buNone/>
+              <a:defRPr sz="667" b="1"/>
             </a:lvl2pPr>
-            <a:lvl3pPr marL="582930" indent="0">
-              <a:buNone/>
-              <a:defRPr sz="1148" b="1"/>
+            <a:lvl3pPr marL="304770" indent="0">
+              <a:buNone/>
+              <a:defRPr sz="600" b="1"/>
             </a:lvl3pPr>
-            <a:lvl4pPr marL="874395" indent="0">
-              <a:buNone/>
-              <a:defRPr sz="1020" b="1"/>
+            <a:lvl4pPr marL="457154" indent="0">
+              <a:buNone/>
+              <a:defRPr sz="533" b="1"/>
             </a:lvl4pPr>
-            <a:lvl5pPr marL="1165860" indent="0">
-              <a:buNone/>
-              <a:defRPr sz="1020" b="1"/>
+            <a:lvl5pPr marL="609539" indent="0">
+              <a:buNone/>
+              <a:defRPr sz="533" b="1"/>
             </a:lvl5pPr>
-            <a:lvl6pPr marL="1457325" indent="0">
-              <a:buNone/>
-              <a:defRPr sz="1020" b="1"/>
+            <a:lvl6pPr marL="761924" indent="0">
+              <a:buNone/>
+              <a:defRPr sz="533" b="1"/>
             </a:lvl6pPr>
-            <a:lvl7pPr marL="1748790" indent="0">
-              <a:buNone/>
-              <a:defRPr sz="1020" b="1"/>
+            <a:lvl7pPr marL="914309" indent="0">
+              <a:buNone/>
+              <a:defRPr sz="533" b="1"/>
             </a:lvl7pPr>
-            <a:lvl8pPr marL="2040255" indent="0">
-              <a:buNone/>
-              <a:defRPr sz="1020" b="1"/>
+            <a:lvl8pPr marL="1066693" indent="0">
+              <a:buNone/>
+              <a:defRPr sz="533" b="1"/>
             </a:lvl8pPr>
-            <a:lvl9pPr marL="2331720" indent="0">
-              <a:buNone/>
-              <a:defRPr sz="1020" b="1"/>
+            <a:lvl9pPr marL="1219078" indent="0">
+              <a:buNone/>
+              <a:defRPr sz="533" b="1"/>
             </a:lvl9pPr>
           </a:lstStyle>
           <a:p>
             <a:pPr lvl="0"/>
             <a:r>
-              <a:rPr lang="en-US"/>
-              <a:t>Click to edit Master text styles</a:t>
+              <a:rPr lang="en-US" smtClean="0"/>
+              <a:t>Edit Master text styles</a:t>
             </a:r>
           </a:p>
         </p:txBody>
@@ -1885,8 +1890,8 @@
         </p:nvSpPr>
         <p:spPr>
           <a:xfrm>
-            <a:off x="535365" y="1670050"/>
-            <a:ext cx="3288089" cy="2456392"/>
+            <a:off x="409397" y="835025"/>
+            <a:ext cx="2514421" cy="1228196"/>
           </a:xfrm>
         </p:spPr>
         <p:txBody>
@@ -1895,35 +1900,35 @@
           <a:p>
             <a:pPr lvl="0"/>
             <a:r>
-              <a:rPr lang="en-US"/>
-              <a:t>Click to edit Master text styles</a:t>
+              <a:rPr lang="en-US" smtClean="0"/>
+              <a:t>Edit Master text styles</a:t>
             </a:r>
           </a:p>
           <a:p>
             <a:pPr lvl="1"/>
             <a:r>
-              <a:rPr lang="en-US"/>
+              <a:rPr lang="en-US" smtClean="0"/>
               <a:t>Second level</a:t>
             </a:r>
           </a:p>
           <a:p>
             <a:pPr lvl="2"/>
             <a:r>
-              <a:rPr lang="en-US"/>
+              <a:rPr lang="en-US" smtClean="0"/>
               <a:t>Third level</a:t>
             </a:r>
           </a:p>
           <a:p>
             <a:pPr lvl="3"/>
             <a:r>
-              <a:rPr lang="en-US"/>
+              <a:rPr lang="en-US" smtClean="0"/>
               <a:t>Fourth level</a:t>
             </a:r>
           </a:p>
           <a:p>
             <a:pPr lvl="4"/>
             <a:r>
-              <a:rPr lang="en-US"/>
+              <a:rPr lang="en-US" smtClean="0"/>
               <a:t>Fifth level</a:t>
             </a:r>
             <a:endParaRPr lang="en-US" dirty="0"/>
@@ -1942,8 +1947,8 @@
         </p:nvSpPr>
         <p:spPr>
           <a:xfrm>
-            <a:off x="3934778" y="1120775"/>
-            <a:ext cx="3304282" cy="549275"/>
+            <a:off x="3008948" y="560388"/>
+            <a:ext cx="2526804" cy="274637"/>
           </a:xfrm>
         </p:spPr>
         <p:txBody>
@@ -1951,46 +1956,46 @@
           <a:lstStyle>
             <a:lvl1pPr marL="0" indent="0">
               <a:buNone/>
-              <a:defRPr sz="1530" b="1"/>
+              <a:defRPr sz="800" b="1"/>
             </a:lvl1pPr>
-            <a:lvl2pPr marL="291465" indent="0">
-              <a:buNone/>
-              <a:defRPr sz="1275" b="1"/>
+            <a:lvl2pPr marL="152385" indent="0">
+              <a:buNone/>
+              <a:defRPr sz="667" b="1"/>
             </a:lvl2pPr>
-            <a:lvl3pPr marL="582930" indent="0">
-              <a:buNone/>
-              <a:defRPr sz="1148" b="1"/>
+            <a:lvl3pPr marL="304770" indent="0">
+              <a:buNone/>
+              <a:defRPr sz="600" b="1"/>
             </a:lvl3pPr>
-            <a:lvl4pPr marL="874395" indent="0">
-              <a:buNone/>
-              <a:defRPr sz="1020" b="1"/>
+            <a:lvl4pPr marL="457154" indent="0">
+              <a:buNone/>
+              <a:defRPr sz="533" b="1"/>
             </a:lvl4pPr>
-            <a:lvl5pPr marL="1165860" indent="0">
-              <a:buNone/>
-              <a:defRPr sz="1020" b="1"/>
+            <a:lvl5pPr marL="609539" indent="0">
+              <a:buNone/>
+              <a:defRPr sz="533" b="1"/>
             </a:lvl5pPr>
-            <a:lvl6pPr marL="1457325" indent="0">
-              <a:buNone/>
-              <a:defRPr sz="1020" b="1"/>
+            <a:lvl6pPr marL="761924" indent="0">
+              <a:buNone/>
+              <a:defRPr sz="533" b="1"/>
             </a:lvl6pPr>
-            <a:lvl7pPr marL="1748790" indent="0">
-              <a:buNone/>
-              <a:defRPr sz="1020" b="1"/>
+            <a:lvl7pPr marL="914309" indent="0">
+              <a:buNone/>
+              <a:defRPr sz="533" b="1"/>
             </a:lvl7pPr>
-            <a:lvl8pPr marL="2040255" indent="0">
-              <a:buNone/>
-              <a:defRPr sz="1020" b="1"/>
+            <a:lvl8pPr marL="1066693" indent="0">
+              <a:buNone/>
+              <a:defRPr sz="533" b="1"/>
             </a:lvl8pPr>
-            <a:lvl9pPr marL="2331720" indent="0">
-              <a:buNone/>
-              <a:defRPr sz="1020" b="1"/>
+            <a:lvl9pPr marL="1219078" indent="0">
+              <a:buNone/>
+              <a:defRPr sz="533" b="1"/>
             </a:lvl9pPr>
           </a:lstStyle>
           <a:p>
             <a:pPr lvl="0"/>
             <a:r>
-              <a:rPr lang="en-US"/>
-              <a:t>Click to edit Master text styles</a:t>
+              <a:rPr lang="en-US" smtClean="0"/>
+              <a:t>Edit Master text styles</a:t>
             </a:r>
           </a:p>
         </p:txBody>
@@ -2007,8 +2012,8 @@
         </p:nvSpPr>
         <p:spPr>
           <a:xfrm>
-            <a:off x="3934778" y="1670050"/>
-            <a:ext cx="3304282" cy="2456392"/>
+            <a:off x="3008948" y="835025"/>
+            <a:ext cx="2526804" cy="1228196"/>
           </a:xfrm>
         </p:spPr>
         <p:txBody>
@@ -2017,35 +2022,35 @@
           <a:p>
             <a:pPr lvl="0"/>
             <a:r>
-              <a:rPr lang="en-US"/>
-              <a:t>Click to edit Master text styles</a:t>
+              <a:rPr lang="en-US" smtClean="0"/>
+              <a:t>Edit Master text styles</a:t>
             </a:r>
           </a:p>
           <a:p>
             <a:pPr lvl="1"/>
             <a:r>
-              <a:rPr lang="en-US"/>
+              <a:rPr lang="en-US" smtClean="0"/>
               <a:t>Second level</a:t>
             </a:r>
           </a:p>
           <a:p>
             <a:pPr lvl="2"/>
             <a:r>
-              <a:rPr lang="en-US"/>
+              <a:rPr lang="en-US" smtClean="0"/>
               <a:t>Third level</a:t>
             </a:r>
           </a:p>
           <a:p>
             <a:pPr lvl="3"/>
             <a:r>
-              <a:rPr lang="en-US"/>
+              <a:rPr lang="en-US" smtClean="0"/>
               <a:t>Fourth level</a:t>
             </a:r>
           </a:p>
           <a:p>
             <a:pPr lvl="4"/>
             <a:r>
-              <a:rPr lang="en-US"/>
+              <a:rPr lang="en-US" smtClean="0"/>
               <a:t>Fifth level</a:t>
             </a:r>
             <a:endParaRPr lang="en-US" dirty="0"/>
@@ -2069,7 +2074,7 @@
           <a:p>
             <a:fld id="{555CB1E9-1B70-44A6-BC16-8CF25AACBDAA}" type="datetimeFigureOut">
               <a:rPr lang="tr-TR" smtClean="0"/>
-              <a:t>1.09.2019</a:t>
+              <a:t>9.09.2019</a:t>
             </a:fld>
             <a:endParaRPr lang="tr-TR"/>
           </a:p>
@@ -2120,7 +2125,7 @@
     </p:spTree>
     <p:extLst>
       <p:ext uri="{BB962C8B-B14F-4D97-AF65-F5344CB8AC3E}">
-        <p14:creationId xmlns:p14="http://schemas.microsoft.com/office/powerpoint/2010/main" val="898270617"/>
+        <p14:creationId xmlns:p14="http://schemas.microsoft.com/office/powerpoint/2010/main" val="1061026304"/>
       </p:ext>
     </p:extLst>
   </p:cSld>
@@ -2163,7 +2168,7 @@
           <a:lstStyle/>
           <a:p>
             <a:r>
-              <a:rPr lang="en-US"/>
+              <a:rPr lang="en-US" smtClean="0"/>
               <a:t>Click to edit Master title style</a:t>
             </a:r>
             <a:endParaRPr lang="en-US" dirty="0"/>
@@ -2187,7 +2192,7 @@
           <a:p>
             <a:fld id="{555CB1E9-1B70-44A6-BC16-8CF25AACBDAA}" type="datetimeFigureOut">
               <a:rPr lang="tr-TR" smtClean="0"/>
-              <a:t>1.09.2019</a:t>
+              <a:t>9.09.2019</a:t>
             </a:fld>
             <a:endParaRPr lang="tr-TR"/>
           </a:p>
@@ -2238,7 +2243,7 @@
     </p:spTree>
     <p:extLst>
       <p:ext uri="{BB962C8B-B14F-4D97-AF65-F5344CB8AC3E}">
-        <p14:creationId xmlns:p14="http://schemas.microsoft.com/office/powerpoint/2010/main" val="980976666"/>
+        <p14:creationId xmlns:p14="http://schemas.microsoft.com/office/powerpoint/2010/main" val="3448487182"/>
       </p:ext>
     </p:extLst>
   </p:cSld>
@@ -2282,7 +2287,7 @@
           <a:p>
             <a:fld id="{555CB1E9-1B70-44A6-BC16-8CF25AACBDAA}" type="datetimeFigureOut">
               <a:rPr lang="tr-TR" smtClean="0"/>
-              <a:t>1.09.2019</a:t>
+              <a:t>9.09.2019</a:t>
             </a:fld>
             <a:endParaRPr lang="tr-TR"/>
           </a:p>
@@ -2333,7 +2338,7 @@
     </p:spTree>
     <p:extLst>
       <p:ext uri="{BB962C8B-B14F-4D97-AF65-F5344CB8AC3E}">
-        <p14:creationId xmlns:p14="http://schemas.microsoft.com/office/powerpoint/2010/main" val="2399206389"/>
+        <p14:creationId xmlns:p14="http://schemas.microsoft.com/office/powerpoint/2010/main" val="1349326905"/>
       </p:ext>
     </p:extLst>
   </p:cSld>
@@ -2372,20 +2377,20 @@
         </p:nvSpPr>
         <p:spPr>
           <a:xfrm>
-            <a:off x="535365" y="304800"/>
-            <a:ext cx="2506801" cy="1066800"/>
+            <a:off x="409397" y="152400"/>
+            <a:ext cx="1916966" cy="533400"/>
           </a:xfrm>
         </p:spPr>
         <p:txBody>
           <a:bodyPr anchor="b"/>
           <a:lstStyle>
             <a:lvl1pPr>
-              <a:defRPr sz="2040"/>
+              <a:defRPr sz="1067"/>
             </a:lvl1pPr>
           </a:lstStyle>
           <a:p>
             <a:r>
-              <a:rPr lang="en-US"/>
+              <a:rPr lang="en-US" smtClean="0"/>
               <a:t>Click to edit Master title style</a:t>
             </a:r>
             <a:endParaRPr lang="en-US" dirty="0"/>
@@ -2404,73 +2409,73 @@
         </p:nvSpPr>
         <p:spPr>
           <a:xfrm>
-            <a:off x="3304282" y="658284"/>
-            <a:ext cx="3934778" cy="3249083"/>
+            <a:off x="2526804" y="329142"/>
+            <a:ext cx="3008948" cy="1624542"/>
           </a:xfrm>
         </p:spPr>
         <p:txBody>
           <a:bodyPr/>
           <a:lstStyle>
             <a:lvl1pPr>
-              <a:defRPr sz="2040"/>
+              <a:defRPr sz="1067"/>
             </a:lvl1pPr>
             <a:lvl2pPr>
-              <a:defRPr sz="1785"/>
+              <a:defRPr sz="933"/>
             </a:lvl2pPr>
             <a:lvl3pPr>
-              <a:defRPr sz="1530"/>
+              <a:defRPr sz="800"/>
             </a:lvl3pPr>
             <a:lvl4pPr>
-              <a:defRPr sz="1275"/>
+              <a:defRPr sz="667"/>
             </a:lvl4pPr>
             <a:lvl5pPr>
-              <a:defRPr sz="1275"/>
+              <a:defRPr sz="667"/>
             </a:lvl5pPr>
             <a:lvl6pPr>
-              <a:defRPr sz="1275"/>
+              <a:defRPr sz="667"/>
             </a:lvl6pPr>
             <a:lvl7pPr>
-              <a:defRPr sz="1275"/>
+              <a:defRPr sz="667"/>
             </a:lvl7pPr>
             <a:lvl8pPr>
-              <a:defRPr sz="1275"/>
+              <a:defRPr sz="667"/>
             </a:lvl8pPr>
             <a:lvl9pPr>
-              <a:defRPr sz="1275"/>
+              <a:defRPr sz="667"/>
             </a:lvl9pPr>
           </a:lstStyle>
           <a:p>
             <a:pPr lvl="0"/>
             <a:r>
-              <a:rPr lang="en-US"/>
-              <a:t>Click to edit Master text styles</a:t>
+              <a:rPr lang="en-US" smtClean="0"/>
+              <a:t>Edit Master text styles</a:t>
             </a:r>
           </a:p>
           <a:p>
             <a:pPr lvl="1"/>
             <a:r>
-              <a:rPr lang="en-US"/>
+              <a:rPr lang="en-US" smtClean="0"/>
               <a:t>Second level</a:t>
             </a:r>
           </a:p>
           <a:p>
             <a:pPr lvl="2"/>
             <a:r>
-              <a:rPr lang="en-US"/>
+              <a:rPr lang="en-US" smtClean="0"/>
               <a:t>Third level</a:t>
             </a:r>
           </a:p>
           <a:p>
             <a:pPr lvl="3"/>
             <a:r>
-              <a:rPr lang="en-US"/>
+              <a:rPr lang="en-US" smtClean="0"/>
               <a:t>Fourth level</a:t>
             </a:r>
           </a:p>
           <a:p>
             <a:pPr lvl="4"/>
             <a:r>
-              <a:rPr lang="en-US"/>
+              <a:rPr lang="en-US" smtClean="0"/>
               <a:t>Fifth level</a:t>
             </a:r>
             <a:endParaRPr lang="en-US" dirty="0"/>
@@ -2489,8 +2494,8 @@
         </p:nvSpPr>
         <p:spPr>
           <a:xfrm>
-            <a:off x="535365" y="1371600"/>
-            <a:ext cx="2506801" cy="2541059"/>
+            <a:off x="409397" y="685800"/>
+            <a:ext cx="1916966" cy="1270529"/>
           </a:xfrm>
         </p:spPr>
         <p:txBody>
@@ -2498,46 +2503,46 @@
           <a:lstStyle>
             <a:lvl1pPr marL="0" indent="0">
               <a:buNone/>
-              <a:defRPr sz="1020"/>
+              <a:defRPr sz="533"/>
             </a:lvl1pPr>
-            <a:lvl2pPr marL="291465" indent="0">
-              <a:buNone/>
-              <a:defRPr sz="893"/>
+            <a:lvl2pPr marL="152385" indent="0">
+              <a:buNone/>
+              <a:defRPr sz="467"/>
             </a:lvl2pPr>
-            <a:lvl3pPr marL="582930" indent="0">
-              <a:buNone/>
-              <a:defRPr sz="765"/>
+            <a:lvl3pPr marL="304770" indent="0">
+              <a:buNone/>
+              <a:defRPr sz="400"/>
             </a:lvl3pPr>
-            <a:lvl4pPr marL="874395" indent="0">
-              <a:buNone/>
-              <a:defRPr sz="638"/>
+            <a:lvl4pPr marL="457154" indent="0">
+              <a:buNone/>
+              <a:defRPr sz="333"/>
             </a:lvl4pPr>
-            <a:lvl5pPr marL="1165860" indent="0">
-              <a:buNone/>
-              <a:defRPr sz="638"/>
+            <a:lvl5pPr marL="609539" indent="0">
+              <a:buNone/>
+              <a:defRPr sz="333"/>
             </a:lvl5pPr>
-            <a:lvl6pPr marL="1457325" indent="0">
-              <a:buNone/>
-              <a:defRPr sz="638"/>
+            <a:lvl6pPr marL="761924" indent="0">
+              <a:buNone/>
+              <a:defRPr sz="333"/>
             </a:lvl6pPr>
-            <a:lvl7pPr marL="1748790" indent="0">
-              <a:buNone/>
-              <a:defRPr sz="638"/>
+            <a:lvl7pPr marL="914309" indent="0">
+              <a:buNone/>
+              <a:defRPr sz="333"/>
             </a:lvl7pPr>
-            <a:lvl8pPr marL="2040255" indent="0">
-              <a:buNone/>
-              <a:defRPr sz="638"/>
+            <a:lvl8pPr marL="1066693" indent="0">
+              <a:buNone/>
+              <a:defRPr sz="333"/>
             </a:lvl8pPr>
-            <a:lvl9pPr marL="2331720" indent="0">
-              <a:buNone/>
-              <a:defRPr sz="638"/>
+            <a:lvl9pPr marL="1219078" indent="0">
+              <a:buNone/>
+              <a:defRPr sz="333"/>
             </a:lvl9pPr>
           </a:lstStyle>
           <a:p>
             <a:pPr lvl="0"/>
             <a:r>
-              <a:rPr lang="en-US"/>
-              <a:t>Click to edit Master text styles</a:t>
+              <a:rPr lang="en-US" smtClean="0"/>
+              <a:t>Edit Master text styles</a:t>
             </a:r>
           </a:p>
         </p:txBody>
@@ -2559,7 +2564,7 @@
           <a:p>
             <a:fld id="{555CB1E9-1B70-44A6-BC16-8CF25AACBDAA}" type="datetimeFigureOut">
               <a:rPr lang="tr-TR" smtClean="0"/>
-              <a:t>1.09.2019</a:t>
+              <a:t>9.09.2019</a:t>
             </a:fld>
             <a:endParaRPr lang="tr-TR"/>
           </a:p>
@@ -2610,7 +2615,7 @@
     </p:spTree>
     <p:extLst>
       <p:ext uri="{BB962C8B-B14F-4D97-AF65-F5344CB8AC3E}">
-        <p14:creationId xmlns:p14="http://schemas.microsoft.com/office/powerpoint/2010/main" val="3855678812"/>
+        <p14:creationId xmlns:p14="http://schemas.microsoft.com/office/powerpoint/2010/main" val="1741677850"/>
       </p:ext>
     </p:extLst>
   </p:cSld>
@@ -2649,20 +2654,20 @@
         </p:nvSpPr>
         <p:spPr>
           <a:xfrm>
-            <a:off x="535365" y="304800"/>
-            <a:ext cx="2506801" cy="1066800"/>
+            <a:off x="409397" y="152400"/>
+            <a:ext cx="1916966" cy="533400"/>
           </a:xfrm>
         </p:spPr>
         <p:txBody>
           <a:bodyPr anchor="b"/>
           <a:lstStyle>
             <a:lvl1pPr>
-              <a:defRPr sz="2040"/>
+              <a:defRPr sz="1067"/>
             </a:lvl1pPr>
           </a:lstStyle>
           <a:p>
             <a:r>
-              <a:rPr lang="en-US"/>
+              <a:rPr lang="en-US" smtClean="0"/>
               <a:t>Click to edit Master title style</a:t>
             </a:r>
             <a:endParaRPr lang="en-US" dirty="0"/>
@@ -2681,8 +2686,8 @@
         </p:nvSpPr>
         <p:spPr>
           <a:xfrm>
-            <a:off x="3304282" y="658284"/>
-            <a:ext cx="3934778" cy="3249083"/>
+            <a:off x="2526804" y="329142"/>
+            <a:ext cx="3008948" cy="1624542"/>
           </a:xfrm>
         </p:spPr>
         <p:txBody>
@@ -2690,44 +2695,44 @@
           <a:lstStyle>
             <a:lvl1pPr marL="0" indent="0">
               <a:buNone/>
-              <a:defRPr sz="2040"/>
+              <a:defRPr sz="1067"/>
             </a:lvl1pPr>
-            <a:lvl2pPr marL="291465" indent="0">
-              <a:buNone/>
-              <a:defRPr sz="1785"/>
+            <a:lvl2pPr marL="152385" indent="0">
+              <a:buNone/>
+              <a:defRPr sz="933"/>
             </a:lvl2pPr>
-            <a:lvl3pPr marL="582930" indent="0">
-              <a:buNone/>
-              <a:defRPr sz="1530"/>
+            <a:lvl3pPr marL="304770" indent="0">
+              <a:buNone/>
+              <a:defRPr sz="800"/>
             </a:lvl3pPr>
-            <a:lvl4pPr marL="874395" indent="0">
-              <a:buNone/>
-              <a:defRPr sz="1275"/>
+            <a:lvl4pPr marL="457154" indent="0">
+              <a:buNone/>
+              <a:defRPr sz="667"/>
             </a:lvl4pPr>
-            <a:lvl5pPr marL="1165860" indent="0">
-              <a:buNone/>
-              <a:defRPr sz="1275"/>
+            <a:lvl5pPr marL="609539" indent="0">
+              <a:buNone/>
+              <a:defRPr sz="667"/>
             </a:lvl5pPr>
-            <a:lvl6pPr marL="1457325" indent="0">
-              <a:buNone/>
-              <a:defRPr sz="1275"/>
+            <a:lvl6pPr marL="761924" indent="0">
+              <a:buNone/>
+              <a:defRPr sz="667"/>
             </a:lvl6pPr>
-            <a:lvl7pPr marL="1748790" indent="0">
-              <a:buNone/>
-              <a:defRPr sz="1275"/>
+            <a:lvl7pPr marL="914309" indent="0">
+              <a:buNone/>
+              <a:defRPr sz="667"/>
             </a:lvl7pPr>
-            <a:lvl8pPr marL="2040255" indent="0">
-              <a:buNone/>
-              <a:defRPr sz="1275"/>
+            <a:lvl8pPr marL="1066693" indent="0">
+              <a:buNone/>
+              <a:defRPr sz="667"/>
             </a:lvl8pPr>
-            <a:lvl9pPr marL="2331720" indent="0">
-              <a:buNone/>
-              <a:defRPr sz="1275"/>
+            <a:lvl9pPr marL="1219078" indent="0">
+              <a:buNone/>
+              <a:defRPr sz="667"/>
             </a:lvl9pPr>
           </a:lstStyle>
           <a:p>
             <a:r>
-              <a:rPr lang="en-US"/>
+              <a:rPr lang="en-US" smtClean="0"/>
               <a:t>Click icon to add picture</a:t>
             </a:r>
             <a:endParaRPr lang="en-US" dirty="0"/>
@@ -2746,8 +2751,8 @@
         </p:nvSpPr>
         <p:spPr>
           <a:xfrm>
-            <a:off x="535365" y="1371600"/>
-            <a:ext cx="2506801" cy="2541059"/>
+            <a:off x="409397" y="685800"/>
+            <a:ext cx="1916966" cy="1270529"/>
           </a:xfrm>
         </p:spPr>
         <p:txBody>
@@ -2755,46 +2760,46 @@
           <a:lstStyle>
             <a:lvl1pPr marL="0" indent="0">
               <a:buNone/>
-              <a:defRPr sz="1020"/>
+              <a:defRPr sz="533"/>
             </a:lvl1pPr>
-            <a:lvl2pPr marL="291465" indent="0">
-              <a:buNone/>
-              <a:defRPr sz="893"/>
+            <a:lvl2pPr marL="152385" indent="0">
+              <a:buNone/>
+              <a:defRPr sz="467"/>
             </a:lvl2pPr>
-            <a:lvl3pPr marL="582930" indent="0">
-              <a:buNone/>
-              <a:defRPr sz="765"/>
+            <a:lvl3pPr marL="304770" indent="0">
+              <a:buNone/>
+              <a:defRPr sz="400"/>
             </a:lvl3pPr>
-            <a:lvl4pPr marL="874395" indent="0">
-              <a:buNone/>
-              <a:defRPr sz="638"/>
+            <a:lvl4pPr marL="457154" indent="0">
+              <a:buNone/>
+              <a:defRPr sz="333"/>
             </a:lvl4pPr>
-            <a:lvl5pPr marL="1165860" indent="0">
-              <a:buNone/>
-              <a:defRPr sz="638"/>
+            <a:lvl5pPr marL="609539" indent="0">
+              <a:buNone/>
+              <a:defRPr sz="333"/>
             </a:lvl5pPr>
-            <a:lvl6pPr marL="1457325" indent="0">
-              <a:buNone/>
-              <a:defRPr sz="638"/>
+            <a:lvl6pPr marL="761924" indent="0">
+              <a:buNone/>
+              <a:defRPr sz="333"/>
             </a:lvl6pPr>
-            <a:lvl7pPr marL="1748790" indent="0">
-              <a:buNone/>
-              <a:defRPr sz="638"/>
+            <a:lvl7pPr marL="914309" indent="0">
+              <a:buNone/>
+              <a:defRPr sz="333"/>
             </a:lvl7pPr>
-            <a:lvl8pPr marL="2040255" indent="0">
-              <a:buNone/>
-              <a:defRPr sz="638"/>
+            <a:lvl8pPr marL="1066693" indent="0">
+              <a:buNone/>
+              <a:defRPr sz="333"/>
             </a:lvl8pPr>
-            <a:lvl9pPr marL="2331720" indent="0">
-              <a:buNone/>
-              <a:defRPr sz="638"/>
+            <a:lvl9pPr marL="1219078" indent="0">
+              <a:buNone/>
+              <a:defRPr sz="333"/>
             </a:lvl9pPr>
           </a:lstStyle>
           <a:p>
             <a:pPr lvl="0"/>
             <a:r>
-              <a:rPr lang="en-US"/>
-              <a:t>Click to edit Master text styles</a:t>
+              <a:rPr lang="en-US" smtClean="0"/>
+              <a:t>Edit Master text styles</a:t>
             </a:r>
           </a:p>
         </p:txBody>
@@ -2816,7 +2821,7 @@
           <a:p>
             <a:fld id="{555CB1E9-1B70-44A6-BC16-8CF25AACBDAA}" type="datetimeFigureOut">
               <a:rPr lang="tr-TR" smtClean="0"/>
-              <a:t>1.09.2019</a:t>
+              <a:t>9.09.2019</a:t>
             </a:fld>
             <a:endParaRPr lang="tr-TR"/>
           </a:p>
@@ -2867,7 +2872,7 @@
     </p:spTree>
     <p:extLst>
       <p:ext uri="{BB962C8B-B14F-4D97-AF65-F5344CB8AC3E}">
-        <p14:creationId xmlns:p14="http://schemas.microsoft.com/office/powerpoint/2010/main" val="912987186"/>
+        <p14:creationId xmlns:p14="http://schemas.microsoft.com/office/powerpoint/2010/main" val="1621776557"/>
       </p:ext>
     </p:extLst>
   </p:cSld>
@@ -2911,8 +2916,8 @@
         </p:nvSpPr>
         <p:spPr>
           <a:xfrm>
-            <a:off x="534353" y="243417"/>
-            <a:ext cx="6703695" cy="883709"/>
+            <a:off x="408623" y="121709"/>
+            <a:ext cx="5126355" cy="441854"/>
           </a:xfrm>
           <a:prstGeom prst="rect">
             <a:avLst/>
@@ -2925,7 +2930,7 @@
           <a:lstStyle/>
           <a:p>
             <a:r>
-              <a:rPr lang="en-US"/>
+              <a:rPr lang="en-US" smtClean="0"/>
               <a:t>Click to edit Master title style</a:t>
             </a:r>
             <a:endParaRPr lang="en-US" dirty="0"/>
@@ -2944,8 +2949,8 @@
         </p:nvSpPr>
         <p:spPr>
           <a:xfrm>
-            <a:off x="534353" y="1217083"/>
-            <a:ext cx="6703695" cy="2900892"/>
+            <a:off x="408623" y="608542"/>
+            <a:ext cx="5126355" cy="1450446"/>
           </a:xfrm>
           <a:prstGeom prst="rect">
             <a:avLst/>
@@ -2959,35 +2964,35 @@
           <a:p>
             <a:pPr lvl="0"/>
             <a:r>
-              <a:rPr lang="en-US"/>
-              <a:t>Click to edit Master text styles</a:t>
+              <a:rPr lang="en-US" smtClean="0"/>
+              <a:t>Edit Master text styles</a:t>
             </a:r>
           </a:p>
           <a:p>
             <a:pPr lvl="1"/>
             <a:r>
-              <a:rPr lang="en-US"/>
+              <a:rPr lang="en-US" smtClean="0"/>
               <a:t>Second level</a:t>
             </a:r>
           </a:p>
           <a:p>
             <a:pPr lvl="2"/>
             <a:r>
-              <a:rPr lang="en-US"/>
+              <a:rPr lang="en-US" smtClean="0"/>
               <a:t>Third level</a:t>
             </a:r>
           </a:p>
           <a:p>
             <a:pPr lvl="3"/>
             <a:r>
-              <a:rPr lang="en-US"/>
+              <a:rPr lang="en-US" smtClean="0"/>
               <a:t>Fourth level</a:t>
             </a:r>
           </a:p>
           <a:p>
             <a:pPr lvl="4"/>
             <a:r>
-              <a:rPr lang="en-US"/>
+              <a:rPr lang="en-US" smtClean="0"/>
               <a:t>Fifth level</a:t>
             </a:r>
             <a:endParaRPr lang="en-US" dirty="0"/>
@@ -3006,8 +3011,8 @@
         </p:nvSpPr>
         <p:spPr>
           <a:xfrm>
-            <a:off x="534353" y="4237567"/>
-            <a:ext cx="1748790" cy="243417"/>
+            <a:off x="408623" y="2118784"/>
+            <a:ext cx="1337310" cy="121708"/>
           </a:xfrm>
           <a:prstGeom prst="rect">
             <a:avLst/>
@@ -3017,7 +3022,7 @@
           <a:bodyPr vert="horz" lIns="91440" tIns="45720" rIns="91440" bIns="45720" rtlCol="0" anchor="ctr"/>
           <a:lstStyle>
             <a:lvl1pPr algn="l">
-              <a:defRPr sz="765">
+              <a:defRPr sz="400">
                 <a:solidFill>
                   <a:schemeClr val="tx1">
                     <a:tint val="75000"/>
@@ -3029,7 +3034,7 @@
           <a:p>
             <a:fld id="{555CB1E9-1B70-44A6-BC16-8CF25AACBDAA}" type="datetimeFigureOut">
               <a:rPr lang="tr-TR" smtClean="0"/>
-              <a:t>1.09.2019</a:t>
+              <a:t>9.09.2019</a:t>
             </a:fld>
             <a:endParaRPr lang="tr-TR"/>
           </a:p>
@@ -3047,8 +3052,8 @@
         </p:nvSpPr>
         <p:spPr>
           <a:xfrm>
-            <a:off x="2574608" y="4237567"/>
-            <a:ext cx="2623185" cy="243417"/>
+            <a:off x="1968818" y="2118784"/>
+            <a:ext cx="2005965" cy="121708"/>
           </a:xfrm>
           <a:prstGeom prst="rect">
             <a:avLst/>
@@ -3058,7 +3063,7 @@
           <a:bodyPr vert="horz" lIns="91440" tIns="45720" rIns="91440" bIns="45720" rtlCol="0" anchor="ctr"/>
           <a:lstStyle>
             <a:lvl1pPr algn="ctr">
-              <a:defRPr sz="765">
+              <a:defRPr sz="400">
                 <a:solidFill>
                   <a:schemeClr val="tx1">
                     <a:tint val="75000"/>
@@ -3084,8 +3089,8 @@
         </p:nvSpPr>
         <p:spPr>
           <a:xfrm>
-            <a:off x="5489258" y="4237567"/>
-            <a:ext cx="1748790" cy="243417"/>
+            <a:off x="4197668" y="2118784"/>
+            <a:ext cx="1337310" cy="121708"/>
           </a:xfrm>
           <a:prstGeom prst="rect">
             <a:avLst/>
@@ -3095,7 +3100,7 @@
           <a:bodyPr vert="horz" lIns="91440" tIns="45720" rIns="91440" bIns="45720" rtlCol="0" anchor="ctr"/>
           <a:lstStyle>
             <a:lvl1pPr algn="r">
-              <a:defRPr sz="765">
+              <a:defRPr sz="400">
                 <a:solidFill>
                   <a:schemeClr val="tx1">
                     <a:tint val="75000"/>
@@ -3116,27 +3121,27 @@
     </p:spTree>
     <p:extLst>
       <p:ext uri="{BB962C8B-B14F-4D97-AF65-F5344CB8AC3E}">
-        <p14:creationId xmlns:p14="http://schemas.microsoft.com/office/powerpoint/2010/main" val="1458546602"/>
+        <p14:creationId xmlns:p14="http://schemas.microsoft.com/office/powerpoint/2010/main" val="1793677390"/>
       </p:ext>
     </p:extLst>
   </p:cSld>
   <p:clrMap bg1="lt1" tx1="dk1" bg2="lt2" tx2="dk2" accent1="accent1" accent2="accent2" accent3="accent3" accent4="accent4" accent5="accent5" accent6="accent6" hlink="hlink" folHlink="folHlink"/>
   <p:sldLayoutIdLst>
-    <p:sldLayoutId id="2147483661" r:id="rId1"/>
-    <p:sldLayoutId id="2147483662" r:id="rId2"/>
-    <p:sldLayoutId id="2147483663" r:id="rId3"/>
-    <p:sldLayoutId id="2147483664" r:id="rId4"/>
-    <p:sldLayoutId id="2147483665" r:id="rId5"/>
-    <p:sldLayoutId id="2147483666" r:id="rId6"/>
-    <p:sldLayoutId id="2147483667" r:id="rId7"/>
-    <p:sldLayoutId id="2147483668" r:id="rId8"/>
-    <p:sldLayoutId id="2147483669" r:id="rId9"/>
-    <p:sldLayoutId id="2147483670" r:id="rId10"/>
-    <p:sldLayoutId id="2147483671" r:id="rId11"/>
+    <p:sldLayoutId id="2147483721" r:id="rId1"/>
+    <p:sldLayoutId id="2147483722" r:id="rId2"/>
+    <p:sldLayoutId id="2147483723" r:id="rId3"/>
+    <p:sldLayoutId id="2147483724" r:id="rId4"/>
+    <p:sldLayoutId id="2147483725" r:id="rId5"/>
+    <p:sldLayoutId id="2147483726" r:id="rId6"/>
+    <p:sldLayoutId id="2147483727" r:id="rId7"/>
+    <p:sldLayoutId id="2147483728" r:id="rId8"/>
+    <p:sldLayoutId id="2147483729" r:id="rId9"/>
+    <p:sldLayoutId id="2147483730" r:id="rId10"/>
+    <p:sldLayoutId id="2147483731" r:id="rId11"/>
   </p:sldLayoutIdLst>
   <p:txStyles>
     <p:titleStyle>
-      <a:lvl1pPr algn="l" defTabSz="582930" rtl="0" eaLnBrk="1" latinLnBrk="0" hangingPunct="1">
+      <a:lvl1pPr algn="l" defTabSz="304770" rtl="0" eaLnBrk="1" latinLnBrk="0" hangingPunct="1">
         <a:lnSpc>
           <a:spcPct val="90000"/>
         </a:lnSpc>
@@ -3144,7 +3149,7 @@
           <a:spcPct val="0"/>
         </a:spcBef>
         <a:buNone/>
-        <a:defRPr sz="2805" kern="1200">
+        <a:defRPr sz="1467" kern="1200">
           <a:solidFill>
             <a:schemeClr val="tx1"/>
           </a:solidFill>
@@ -3155,16 +3160,16 @@
       </a:lvl1pPr>
     </p:titleStyle>
     <p:bodyStyle>
-      <a:lvl1pPr marL="145733" indent="-145733" algn="l" defTabSz="582930" rtl="0" eaLnBrk="1" latinLnBrk="0" hangingPunct="1">
+      <a:lvl1pPr marL="76192" indent="-76192" algn="l" defTabSz="304770" rtl="0" eaLnBrk="1" latinLnBrk="0" hangingPunct="1">
         <a:lnSpc>
           <a:spcPct val="90000"/>
         </a:lnSpc>
         <a:spcBef>
-          <a:spcPts val="638"/>
+          <a:spcPts val="333"/>
         </a:spcBef>
         <a:buFont typeface="Arial" panose="020B0604020202020204" pitchFamily="34" charset="0"/>
         <a:buChar char="•"/>
-        <a:defRPr sz="1785" kern="1200">
+        <a:defRPr sz="933" kern="1200">
           <a:solidFill>
             <a:schemeClr val="tx1"/>
           </a:solidFill>
@@ -3173,16 +3178,16 @@
           <a:cs typeface="+mn-cs"/>
         </a:defRPr>
       </a:lvl1pPr>
-      <a:lvl2pPr marL="437198" indent="-145733" algn="l" defTabSz="582930" rtl="0" eaLnBrk="1" latinLnBrk="0" hangingPunct="1">
+      <a:lvl2pPr marL="228577" indent="-76192" algn="l" defTabSz="304770" rtl="0" eaLnBrk="1" latinLnBrk="0" hangingPunct="1">
         <a:lnSpc>
           <a:spcPct val="90000"/>
         </a:lnSpc>
         <a:spcBef>
-          <a:spcPts val="319"/>
+          <a:spcPts val="167"/>
         </a:spcBef>
         <a:buFont typeface="Arial" panose="020B0604020202020204" pitchFamily="34" charset="0"/>
         <a:buChar char="•"/>
-        <a:defRPr sz="1530" kern="1200">
+        <a:defRPr sz="800" kern="1200">
           <a:solidFill>
             <a:schemeClr val="tx1"/>
           </a:solidFill>
@@ -3191,16 +3196,16 @@
           <a:cs typeface="+mn-cs"/>
         </a:defRPr>
       </a:lvl2pPr>
-      <a:lvl3pPr marL="728663" indent="-145733" algn="l" defTabSz="582930" rtl="0" eaLnBrk="1" latinLnBrk="0" hangingPunct="1">
+      <a:lvl3pPr marL="380962" indent="-76192" algn="l" defTabSz="304770" rtl="0" eaLnBrk="1" latinLnBrk="0" hangingPunct="1">
         <a:lnSpc>
           <a:spcPct val="90000"/>
         </a:lnSpc>
         <a:spcBef>
-          <a:spcPts val="319"/>
+          <a:spcPts val="167"/>
         </a:spcBef>
         <a:buFont typeface="Arial" panose="020B0604020202020204" pitchFamily="34" charset="0"/>
         <a:buChar char="•"/>
-        <a:defRPr sz="1275" kern="1200">
+        <a:defRPr sz="667" kern="1200">
           <a:solidFill>
             <a:schemeClr val="tx1"/>
           </a:solidFill>
@@ -3209,16 +3214,16 @@
           <a:cs typeface="+mn-cs"/>
         </a:defRPr>
       </a:lvl3pPr>
-      <a:lvl4pPr marL="1020128" indent="-145733" algn="l" defTabSz="582930" rtl="0" eaLnBrk="1" latinLnBrk="0" hangingPunct="1">
+      <a:lvl4pPr marL="533347" indent="-76192" algn="l" defTabSz="304770" rtl="0" eaLnBrk="1" latinLnBrk="0" hangingPunct="1">
         <a:lnSpc>
           <a:spcPct val="90000"/>
         </a:lnSpc>
         <a:spcBef>
-          <a:spcPts val="319"/>
+          <a:spcPts val="167"/>
         </a:spcBef>
         <a:buFont typeface="Arial" panose="020B0604020202020204" pitchFamily="34" charset="0"/>
         <a:buChar char="•"/>
-        <a:defRPr sz="1148" kern="1200">
+        <a:defRPr sz="600" kern="1200">
           <a:solidFill>
             <a:schemeClr val="tx1"/>
           </a:solidFill>
@@ -3227,16 +3232,16 @@
           <a:cs typeface="+mn-cs"/>
         </a:defRPr>
       </a:lvl4pPr>
-      <a:lvl5pPr marL="1311593" indent="-145733" algn="l" defTabSz="582930" rtl="0" eaLnBrk="1" latinLnBrk="0" hangingPunct="1">
+      <a:lvl5pPr marL="685731" indent="-76192" algn="l" defTabSz="304770" rtl="0" eaLnBrk="1" latinLnBrk="0" hangingPunct="1">
         <a:lnSpc>
           <a:spcPct val="90000"/>
         </a:lnSpc>
         <a:spcBef>
-          <a:spcPts val="319"/>
+          <a:spcPts val="167"/>
         </a:spcBef>
         <a:buFont typeface="Arial" panose="020B0604020202020204" pitchFamily="34" charset="0"/>
         <a:buChar char="•"/>
-        <a:defRPr sz="1148" kern="1200">
+        <a:defRPr sz="600" kern="1200">
           <a:solidFill>
             <a:schemeClr val="tx1"/>
           </a:solidFill>
@@ -3245,16 +3250,16 @@
           <a:cs typeface="+mn-cs"/>
         </a:defRPr>
       </a:lvl5pPr>
-      <a:lvl6pPr marL="1603058" indent="-145733" algn="l" defTabSz="582930" rtl="0" eaLnBrk="1" latinLnBrk="0" hangingPunct="1">
+      <a:lvl6pPr marL="838116" indent="-76192" algn="l" defTabSz="304770" rtl="0" eaLnBrk="1" latinLnBrk="0" hangingPunct="1">
         <a:lnSpc>
           <a:spcPct val="90000"/>
         </a:lnSpc>
         <a:spcBef>
-          <a:spcPts val="319"/>
+          <a:spcPts val="167"/>
         </a:spcBef>
         <a:buFont typeface="Arial" panose="020B0604020202020204" pitchFamily="34" charset="0"/>
         <a:buChar char="•"/>
-        <a:defRPr sz="1148" kern="1200">
+        <a:defRPr sz="600" kern="1200">
           <a:solidFill>
             <a:schemeClr val="tx1"/>
           </a:solidFill>
@@ -3263,16 +3268,16 @@
           <a:cs typeface="+mn-cs"/>
         </a:defRPr>
       </a:lvl6pPr>
-      <a:lvl7pPr marL="1894523" indent="-145733" algn="l" defTabSz="582930" rtl="0" eaLnBrk="1" latinLnBrk="0" hangingPunct="1">
+      <a:lvl7pPr marL="990501" indent="-76192" algn="l" defTabSz="304770" rtl="0" eaLnBrk="1" latinLnBrk="0" hangingPunct="1">
         <a:lnSpc>
           <a:spcPct val="90000"/>
         </a:lnSpc>
         <a:spcBef>
-          <a:spcPts val="319"/>
+          <a:spcPts val="167"/>
         </a:spcBef>
         <a:buFont typeface="Arial" panose="020B0604020202020204" pitchFamily="34" charset="0"/>
         <a:buChar char="•"/>
-        <a:defRPr sz="1148" kern="1200">
+        <a:defRPr sz="600" kern="1200">
           <a:solidFill>
             <a:schemeClr val="tx1"/>
           </a:solidFill>
@@ -3281,16 +3286,16 @@
           <a:cs typeface="+mn-cs"/>
         </a:defRPr>
       </a:lvl7pPr>
-      <a:lvl8pPr marL="2185988" indent="-145733" algn="l" defTabSz="582930" rtl="0" eaLnBrk="1" latinLnBrk="0" hangingPunct="1">
+      <a:lvl8pPr marL="1142886" indent="-76192" algn="l" defTabSz="304770" rtl="0" eaLnBrk="1" latinLnBrk="0" hangingPunct="1">
         <a:lnSpc>
           <a:spcPct val="90000"/>
         </a:lnSpc>
         <a:spcBef>
-          <a:spcPts val="319"/>
+          <a:spcPts val="167"/>
         </a:spcBef>
         <a:buFont typeface="Arial" panose="020B0604020202020204" pitchFamily="34" charset="0"/>
         <a:buChar char="•"/>
-        <a:defRPr sz="1148" kern="1200">
+        <a:defRPr sz="600" kern="1200">
           <a:solidFill>
             <a:schemeClr val="tx1"/>
           </a:solidFill>
@@ -3299,16 +3304,16 @@
           <a:cs typeface="+mn-cs"/>
         </a:defRPr>
       </a:lvl8pPr>
-      <a:lvl9pPr marL="2477453" indent="-145733" algn="l" defTabSz="582930" rtl="0" eaLnBrk="1" latinLnBrk="0" hangingPunct="1">
+      <a:lvl9pPr marL="1295270" indent="-76192" algn="l" defTabSz="304770" rtl="0" eaLnBrk="1" latinLnBrk="0" hangingPunct="1">
         <a:lnSpc>
           <a:spcPct val="90000"/>
         </a:lnSpc>
         <a:spcBef>
-          <a:spcPts val="319"/>
+          <a:spcPts val="167"/>
         </a:spcBef>
         <a:buFont typeface="Arial" panose="020B0604020202020204" pitchFamily="34" charset="0"/>
         <a:buChar char="•"/>
-        <a:defRPr sz="1148" kern="1200">
+        <a:defRPr sz="600" kern="1200">
           <a:solidFill>
             <a:schemeClr val="tx1"/>
           </a:solidFill>
@@ -3322,8 +3327,8 @@
       <a:defPPr>
         <a:defRPr lang="en-US"/>
       </a:defPPr>
-      <a:lvl1pPr marL="0" algn="l" defTabSz="582930" rtl="0" eaLnBrk="1" latinLnBrk="0" hangingPunct="1">
-        <a:defRPr sz="1148" kern="1200">
+      <a:lvl1pPr marL="0" algn="l" defTabSz="304770" rtl="0" eaLnBrk="1" latinLnBrk="0" hangingPunct="1">
+        <a:defRPr sz="600" kern="1200">
           <a:solidFill>
             <a:schemeClr val="tx1"/>
           </a:solidFill>
@@ -3332,8 +3337,8 @@
           <a:cs typeface="+mn-cs"/>
         </a:defRPr>
       </a:lvl1pPr>
-      <a:lvl2pPr marL="291465" algn="l" defTabSz="582930" rtl="0" eaLnBrk="1" latinLnBrk="0" hangingPunct="1">
-        <a:defRPr sz="1148" kern="1200">
+      <a:lvl2pPr marL="152385" algn="l" defTabSz="304770" rtl="0" eaLnBrk="1" latinLnBrk="0" hangingPunct="1">
+        <a:defRPr sz="600" kern="1200">
           <a:solidFill>
             <a:schemeClr val="tx1"/>
           </a:solidFill>
@@ -3342,8 +3347,8 @@
           <a:cs typeface="+mn-cs"/>
         </a:defRPr>
       </a:lvl2pPr>
-      <a:lvl3pPr marL="582930" algn="l" defTabSz="582930" rtl="0" eaLnBrk="1" latinLnBrk="0" hangingPunct="1">
-        <a:defRPr sz="1148" kern="1200">
+      <a:lvl3pPr marL="304770" algn="l" defTabSz="304770" rtl="0" eaLnBrk="1" latinLnBrk="0" hangingPunct="1">
+        <a:defRPr sz="600" kern="1200">
           <a:solidFill>
             <a:schemeClr val="tx1"/>
           </a:solidFill>
@@ -3352,8 +3357,8 @@
           <a:cs typeface="+mn-cs"/>
         </a:defRPr>
       </a:lvl3pPr>
-      <a:lvl4pPr marL="874395" algn="l" defTabSz="582930" rtl="0" eaLnBrk="1" latinLnBrk="0" hangingPunct="1">
-        <a:defRPr sz="1148" kern="1200">
+      <a:lvl4pPr marL="457154" algn="l" defTabSz="304770" rtl="0" eaLnBrk="1" latinLnBrk="0" hangingPunct="1">
+        <a:defRPr sz="600" kern="1200">
           <a:solidFill>
             <a:schemeClr val="tx1"/>
           </a:solidFill>
@@ -3362,8 +3367,8 @@
           <a:cs typeface="+mn-cs"/>
         </a:defRPr>
       </a:lvl4pPr>
-      <a:lvl5pPr marL="1165860" algn="l" defTabSz="582930" rtl="0" eaLnBrk="1" latinLnBrk="0" hangingPunct="1">
-        <a:defRPr sz="1148" kern="1200">
+      <a:lvl5pPr marL="609539" algn="l" defTabSz="304770" rtl="0" eaLnBrk="1" latinLnBrk="0" hangingPunct="1">
+        <a:defRPr sz="600" kern="1200">
           <a:solidFill>
             <a:schemeClr val="tx1"/>
           </a:solidFill>
@@ -3372,8 +3377,8 @@
           <a:cs typeface="+mn-cs"/>
         </a:defRPr>
       </a:lvl5pPr>
-      <a:lvl6pPr marL="1457325" algn="l" defTabSz="582930" rtl="0" eaLnBrk="1" latinLnBrk="0" hangingPunct="1">
-        <a:defRPr sz="1148" kern="1200">
+      <a:lvl6pPr marL="761924" algn="l" defTabSz="304770" rtl="0" eaLnBrk="1" latinLnBrk="0" hangingPunct="1">
+        <a:defRPr sz="600" kern="1200">
           <a:solidFill>
             <a:schemeClr val="tx1"/>
           </a:solidFill>
@@ -3382,8 +3387,8 @@
           <a:cs typeface="+mn-cs"/>
         </a:defRPr>
       </a:lvl6pPr>
-      <a:lvl7pPr marL="1748790" algn="l" defTabSz="582930" rtl="0" eaLnBrk="1" latinLnBrk="0" hangingPunct="1">
-        <a:defRPr sz="1148" kern="1200">
+      <a:lvl7pPr marL="914309" algn="l" defTabSz="304770" rtl="0" eaLnBrk="1" latinLnBrk="0" hangingPunct="1">
+        <a:defRPr sz="600" kern="1200">
           <a:solidFill>
             <a:schemeClr val="tx1"/>
           </a:solidFill>
@@ -3392,8 +3397,8 @@
           <a:cs typeface="+mn-cs"/>
         </a:defRPr>
       </a:lvl7pPr>
-      <a:lvl8pPr marL="2040255" algn="l" defTabSz="582930" rtl="0" eaLnBrk="1" latinLnBrk="0" hangingPunct="1">
-        <a:defRPr sz="1148" kern="1200">
+      <a:lvl8pPr marL="1066693" algn="l" defTabSz="304770" rtl="0" eaLnBrk="1" latinLnBrk="0" hangingPunct="1">
+        <a:defRPr sz="600" kern="1200">
           <a:solidFill>
             <a:schemeClr val="tx1"/>
           </a:solidFill>
@@ -3402,8 +3407,8 @@
           <a:cs typeface="+mn-cs"/>
         </a:defRPr>
       </a:lvl8pPr>
-      <a:lvl9pPr marL="2331720" algn="l" defTabSz="582930" rtl="0" eaLnBrk="1" latinLnBrk="0" hangingPunct="1">
-        <a:defRPr sz="1148" kern="1200">
+      <a:lvl9pPr marL="1219078" algn="l" defTabSz="304770" rtl="0" eaLnBrk="1" latinLnBrk="0" hangingPunct="1">
+        <a:defRPr sz="600" kern="1200">
           <a:solidFill>
             <a:schemeClr val="tx1"/>
           </a:solidFill>
@@ -3434,598 +3439,617 @@
           <a:chExt cx="0" cy="0"/>
         </a:xfrm>
       </p:grpSpPr>
-      <p:sp>
-        <p:nvSpPr>
-          <p:cNvPr id="5" name="Rectangle 4">
-            <a:extLst>
-              <a:ext uri="{FF2B5EF4-FFF2-40B4-BE49-F238E27FC236}">
-                <a16:creationId xmlns:a16="http://schemas.microsoft.com/office/drawing/2014/main" id="{F08DDDA8-9470-4B19-9D5F-3D29233E8EB9}"/>
-              </a:ext>
-            </a:extLst>
-          </p:cNvPr>
-          <p:cNvSpPr/>
+      <p:grpSp>
+        <p:nvGrpSpPr>
+          <p:cNvPr id="7" name="Group 6"/>
+          <p:cNvGrpSpPr/>
           <p:nvPr/>
-        </p:nvSpPr>
-        <p:spPr>
-          <a:xfrm rot="5400000">
-            <a:off x="372538" y="1463441"/>
-            <a:ext cx="3144251" cy="593558"/>
+        </p:nvGrpSpPr>
+        <p:grpSpPr>
+          <a:xfrm>
+            <a:off x="152092" y="105367"/>
+            <a:ext cx="5697531" cy="2019699"/>
+            <a:chOff x="1000652" y="474785"/>
+            <a:chExt cx="3804763" cy="1348738"/>
           </a:xfrm>
-          <a:prstGeom prst="rect">
-            <a:avLst/>
-          </a:prstGeom>
-        </p:spPr>
-        <p:style>
-          <a:lnRef idx="2">
-            <a:schemeClr val="accent5">
-              <a:shade val="50000"/>
-            </a:schemeClr>
-          </a:lnRef>
-          <a:fillRef idx="1">
-            <a:schemeClr val="accent5"/>
-          </a:fillRef>
-          <a:effectRef idx="0">
-            <a:schemeClr val="accent5"/>
-          </a:effectRef>
-          <a:fontRef idx="minor">
-            <a:schemeClr val="lt1"/>
-          </a:fontRef>
-        </p:style>
-        <p:txBody>
-          <a:bodyPr rot="0" spcFirstLastPara="0" vertOverflow="overflow" horzOverflow="overflow" vert="horz" wrap="square" lIns="91440" tIns="45719" rIns="91440" bIns="45719" numCol="1" spcCol="0" rtlCol="0" fromWordArt="0" anchor="ctr" anchorCtr="0" forceAA="0" compatLnSpc="1">
-            <a:prstTxWarp prst="textNoShape">
+        </p:grpSpPr>
+        <p:sp>
+          <p:nvSpPr>
+            <p:cNvPr id="5" name="Rectangle 4">
+              <a:extLst>
+                <a:ext uri="{FF2B5EF4-FFF2-40B4-BE49-F238E27FC236}">
+                  <a16:creationId xmlns:a16="http://schemas.microsoft.com/office/drawing/2014/main" id="{F08DDDA8-9470-4B19-9D5F-3D29233E8EB9}"/>
+                </a:ext>
+              </a:extLst>
+            </p:cNvPr>
+            <p:cNvSpPr/>
+            <p:nvPr/>
+          </p:nvSpPr>
+          <p:spPr>
+            <a:xfrm rot="5400000">
+              <a:off x="1398218" y="732941"/>
+              <a:ext cx="834039" cy="317728"/>
+            </a:xfrm>
+            <a:prstGeom prst="rect">
               <a:avLst/>
-            </a:prstTxWarp>
-            <a:noAutofit/>
-          </a:bodyPr>
-          <a:lstStyle/>
-          <a:p>
-            <a:pPr algn="ctr"/>
-            <a:r>
-              <a:rPr lang="en-US" sz="1165" dirty="0"/>
-              <a:t>API Service Client</a:t>
-            </a:r>
-            <a:endParaRPr lang="tr-TR" sz="1165" dirty="0"/>
-          </a:p>
-        </p:txBody>
-      </p:sp>
-      <p:sp>
-        <p:nvSpPr>
-          <p:cNvPr id="6" name="Rectangle 5">
-            <a:extLst>
-              <a:ext uri="{FF2B5EF4-FFF2-40B4-BE49-F238E27FC236}">
-                <a16:creationId xmlns:a16="http://schemas.microsoft.com/office/drawing/2014/main" id="{8C47E162-25B0-4D9C-AA3E-283A1981B1C7}"/>
-              </a:ext>
-            </a:extLst>
-          </p:cNvPr>
-          <p:cNvSpPr/>
-          <p:nvPr/>
-        </p:nvSpPr>
-        <p:spPr>
-          <a:xfrm>
-            <a:off x="4884376" y="188094"/>
-            <a:ext cx="1297904" cy="3144253"/>
-          </a:xfrm>
-          <a:prstGeom prst="rect">
-            <a:avLst/>
-          </a:prstGeom>
-        </p:spPr>
-        <p:style>
-          <a:lnRef idx="2">
-            <a:schemeClr val="accent6">
-              <a:shade val="50000"/>
-            </a:schemeClr>
-          </a:lnRef>
-          <a:fillRef idx="1">
-            <a:schemeClr val="accent6"/>
-          </a:fillRef>
-          <a:effectRef idx="0">
-            <a:schemeClr val="accent6"/>
-          </a:effectRef>
-          <a:fontRef idx="minor">
-            <a:schemeClr val="lt1"/>
-          </a:fontRef>
-        </p:style>
-        <p:txBody>
-          <a:bodyPr rot="0" spcFirstLastPara="0" vertOverflow="overflow" horzOverflow="overflow" vert="horz" wrap="square" lIns="91440" tIns="45719" rIns="91440" bIns="45719" numCol="1" spcCol="0" rtlCol="0" fromWordArt="0" anchor="ctr" anchorCtr="0" forceAA="0" compatLnSpc="1">
-            <a:prstTxWarp prst="textNoShape">
+            </a:prstGeom>
+          </p:spPr>
+          <p:style>
+            <a:lnRef idx="2">
+              <a:schemeClr val="accent5">
+                <a:shade val="50000"/>
+              </a:schemeClr>
+            </a:lnRef>
+            <a:fillRef idx="1">
+              <a:schemeClr val="accent5"/>
+            </a:fillRef>
+            <a:effectRef idx="0">
+              <a:schemeClr val="accent5"/>
+            </a:effectRef>
+            <a:fontRef idx="minor">
+              <a:schemeClr val="lt1"/>
+            </a:fontRef>
+          </p:style>
+          <p:txBody>
+            <a:bodyPr rot="0" spcFirstLastPara="0" vertOverflow="overflow" horzOverflow="overflow" vert="horz" wrap="square" lIns="48947" tIns="24473" rIns="48947" bIns="24473" numCol="1" spcCol="0" rtlCol="0" fromWordArt="0" anchor="ctr" anchorCtr="0" forceAA="0" compatLnSpc="1">
+              <a:prstTxWarp prst="textNoShape">
+                <a:avLst/>
+              </a:prstTxWarp>
+              <a:noAutofit/>
+            </a:bodyPr>
+            <a:lstStyle/>
+            <a:p>
+              <a:pPr algn="ctr"/>
+              <a:r>
+                <a:rPr lang="en-US" sz="1100" dirty="0"/>
+                <a:t>API Service Client</a:t>
+              </a:r>
+              <a:endParaRPr lang="tr-TR" sz="1100" dirty="0"/>
+            </a:p>
+          </p:txBody>
+        </p:sp>
+        <p:sp>
+          <p:nvSpPr>
+            <p:cNvPr id="6" name="Rectangle 5">
+              <a:extLst>
+                <a:ext uri="{FF2B5EF4-FFF2-40B4-BE49-F238E27FC236}">
+                  <a16:creationId xmlns:a16="http://schemas.microsoft.com/office/drawing/2014/main" id="{8C47E162-25B0-4D9C-AA3E-283A1981B1C7}"/>
+                </a:ext>
+              </a:extLst>
+            </p:cNvPr>
+            <p:cNvSpPr/>
+            <p:nvPr/>
+          </p:nvSpPr>
+          <p:spPr>
+            <a:xfrm>
+              <a:off x="3388849" y="474786"/>
+              <a:ext cx="694761" cy="834039"/>
+            </a:xfrm>
+            <a:prstGeom prst="rect">
               <a:avLst/>
-            </a:prstTxWarp>
-            <a:noAutofit/>
-          </a:bodyPr>
-          <a:lstStyle/>
-          <a:p>
-            <a:pPr algn="ctr"/>
-            <a:r>
-              <a:rPr lang="en-US" sz="1165" dirty="0"/>
-              <a:t>Web API</a:t>
-            </a:r>
-            <a:endParaRPr lang="tr-TR" sz="1165" dirty="0"/>
-          </a:p>
-        </p:txBody>
-      </p:sp>
-      <p:sp>
-        <p:nvSpPr>
-          <p:cNvPr id="8" name="Rectangle 7">
-            <a:extLst>
-              <a:ext uri="{FF2B5EF4-FFF2-40B4-BE49-F238E27FC236}">
-                <a16:creationId xmlns:a16="http://schemas.microsoft.com/office/drawing/2014/main" id="{E659BFD7-A441-45D5-88C7-39F17404790A}"/>
-              </a:ext>
-            </a:extLst>
-          </p:cNvPr>
-          <p:cNvSpPr/>
-          <p:nvPr/>
-        </p:nvSpPr>
-        <p:spPr>
-          <a:xfrm>
-            <a:off x="422910" y="188093"/>
-            <a:ext cx="934317" cy="3144252"/>
-          </a:xfrm>
-          <a:prstGeom prst="rect">
-            <a:avLst/>
-          </a:prstGeom>
-        </p:spPr>
-        <p:style>
-          <a:lnRef idx="2">
-            <a:schemeClr val="accent1">
-              <a:shade val="50000"/>
-            </a:schemeClr>
-          </a:lnRef>
-          <a:fillRef idx="1">
-            <a:schemeClr val="accent1"/>
-          </a:fillRef>
-          <a:effectRef idx="0">
-            <a:schemeClr val="accent1"/>
-          </a:effectRef>
-          <a:fontRef idx="minor">
-            <a:schemeClr val="lt1"/>
-          </a:fontRef>
-        </p:style>
-        <p:txBody>
-          <a:bodyPr rot="0" spcFirstLastPara="0" vertOverflow="overflow" horzOverflow="overflow" vert="horz" wrap="square" lIns="91440" tIns="45719" rIns="91440" bIns="45719" numCol="1" spcCol="0" rtlCol="0" fromWordArt="0" anchor="ctr" anchorCtr="0" forceAA="0" compatLnSpc="1">
-            <a:prstTxWarp prst="textNoShape">
+            </a:prstGeom>
+          </p:spPr>
+          <p:style>
+            <a:lnRef idx="2">
+              <a:schemeClr val="accent6">
+                <a:shade val="50000"/>
+              </a:schemeClr>
+            </a:lnRef>
+            <a:fillRef idx="1">
+              <a:schemeClr val="accent6"/>
+            </a:fillRef>
+            <a:effectRef idx="0">
+              <a:schemeClr val="accent6"/>
+            </a:effectRef>
+            <a:fontRef idx="minor">
+              <a:schemeClr val="lt1"/>
+            </a:fontRef>
+          </p:style>
+          <p:txBody>
+            <a:bodyPr rot="0" spcFirstLastPara="0" vertOverflow="overflow" horzOverflow="overflow" vert="horz" wrap="square" lIns="48947" tIns="24473" rIns="48947" bIns="24473" numCol="1" spcCol="0" rtlCol="0" fromWordArt="0" anchor="ctr" anchorCtr="0" forceAA="0" compatLnSpc="1">
+              <a:prstTxWarp prst="textNoShape">
+                <a:avLst/>
+              </a:prstTxWarp>
+              <a:noAutofit/>
+            </a:bodyPr>
+            <a:lstStyle/>
+            <a:p>
+              <a:pPr algn="ctr"/>
+              <a:r>
+                <a:rPr lang="en-US" sz="1100" dirty="0"/>
+                <a:t>Web API</a:t>
+              </a:r>
+              <a:endParaRPr lang="tr-TR" sz="1100" dirty="0"/>
+            </a:p>
+          </p:txBody>
+        </p:sp>
+        <p:sp>
+          <p:nvSpPr>
+            <p:cNvPr id="8" name="Rectangle 7">
+              <a:extLst>
+                <a:ext uri="{FF2B5EF4-FFF2-40B4-BE49-F238E27FC236}">
+                  <a16:creationId xmlns:a16="http://schemas.microsoft.com/office/drawing/2014/main" id="{E659BFD7-A441-45D5-88C7-39F17404790A}"/>
+                </a:ext>
+              </a:extLst>
+            </p:cNvPr>
+            <p:cNvSpPr/>
+            <p:nvPr/>
+          </p:nvSpPr>
+          <p:spPr>
+            <a:xfrm>
+              <a:off x="1000652" y="474785"/>
+              <a:ext cx="500134" cy="834039"/>
+            </a:xfrm>
+            <a:prstGeom prst="rect">
               <a:avLst/>
-            </a:prstTxWarp>
-            <a:noAutofit/>
-          </a:bodyPr>
-          <a:lstStyle/>
-          <a:p>
-            <a:pPr algn="ctr"/>
-            <a:r>
-              <a:rPr lang="en-US" sz="1165" dirty="0"/>
-              <a:t>Web UI</a:t>
-            </a:r>
-            <a:endParaRPr lang="tr-TR" sz="1165" dirty="0"/>
-          </a:p>
-        </p:txBody>
-      </p:sp>
-      <p:sp>
-        <p:nvSpPr>
-          <p:cNvPr id="11" name="Flowchart: Magnetic Disk 10">
-            <a:extLst>
-              <a:ext uri="{FF2B5EF4-FFF2-40B4-BE49-F238E27FC236}">
-                <a16:creationId xmlns:a16="http://schemas.microsoft.com/office/drawing/2014/main" id="{13136252-003D-4E5B-AB76-8C67D42FD0D2}"/>
-              </a:ext>
-            </a:extLst>
-          </p:cNvPr>
-          <p:cNvSpPr/>
-          <p:nvPr/>
-        </p:nvSpPr>
-        <p:spPr>
-          <a:xfrm>
-            <a:off x="6486075" y="1304524"/>
-            <a:ext cx="1044634" cy="873290"/>
-          </a:xfrm>
-          <a:prstGeom prst="flowChartMagneticDisk">
-            <a:avLst/>
-          </a:prstGeom>
-          <a:gradFill flip="none" rotWithShape="1">
-            <a:gsLst>
-              <a:gs pos="0">
+            </a:prstGeom>
+          </p:spPr>
+          <p:style>
+            <a:lnRef idx="2">
+              <a:schemeClr val="accent1">
+                <a:shade val="50000"/>
+              </a:schemeClr>
+            </a:lnRef>
+            <a:fillRef idx="1">
+              <a:schemeClr val="accent1"/>
+            </a:fillRef>
+            <a:effectRef idx="0">
+              <a:schemeClr val="accent1"/>
+            </a:effectRef>
+            <a:fontRef idx="minor">
+              <a:schemeClr val="lt1"/>
+            </a:fontRef>
+          </p:style>
+          <p:txBody>
+            <a:bodyPr rot="0" spcFirstLastPara="0" vertOverflow="overflow" horzOverflow="overflow" vert="horz" wrap="square" lIns="48947" tIns="24473" rIns="48947" bIns="24473" numCol="1" spcCol="0" rtlCol="0" fromWordArt="0" anchor="ctr" anchorCtr="0" forceAA="0" compatLnSpc="1">
+              <a:prstTxWarp prst="textNoShape">
+                <a:avLst/>
+              </a:prstTxWarp>
+              <a:noAutofit/>
+            </a:bodyPr>
+            <a:lstStyle/>
+            <a:p>
+              <a:pPr algn="ctr"/>
+              <a:r>
+                <a:rPr lang="en-US" sz="1100" dirty="0"/>
+                <a:t>Web UI</a:t>
+              </a:r>
+              <a:endParaRPr lang="tr-TR" sz="1100" dirty="0"/>
+            </a:p>
+          </p:txBody>
+        </p:sp>
+        <p:sp>
+          <p:nvSpPr>
+            <p:cNvPr id="11" name="Flowchart: Magnetic Disk 10">
+              <a:extLst>
+                <a:ext uri="{FF2B5EF4-FFF2-40B4-BE49-F238E27FC236}">
+                  <a16:creationId xmlns:a16="http://schemas.microsoft.com/office/drawing/2014/main" id="{13136252-003D-4E5B-AB76-8C67D42FD0D2}"/>
+                </a:ext>
+              </a:extLst>
+            </p:cNvPr>
+            <p:cNvSpPr/>
+            <p:nvPr/>
+          </p:nvSpPr>
+          <p:spPr>
+            <a:xfrm>
+              <a:off x="4246228" y="656731"/>
+              <a:ext cx="559187" cy="467467"/>
+            </a:xfrm>
+            <a:prstGeom prst="flowChartMagneticDisk">
+              <a:avLst/>
+            </a:prstGeom>
+            <a:gradFill flip="none" rotWithShape="1">
+              <a:gsLst>
+                <a:gs pos="0">
+                  <a:schemeClr val="accent4">
+                    <a:lumMod val="67000"/>
+                  </a:schemeClr>
+                </a:gs>
+                <a:gs pos="48000">
+                  <a:schemeClr val="accent4">
+                    <a:lumMod val="97000"/>
+                    <a:lumOff val="3000"/>
+                  </a:schemeClr>
+                </a:gs>
+                <a:gs pos="100000">
+                  <a:schemeClr val="accent4">
+                    <a:lumMod val="60000"/>
+                    <a:lumOff val="40000"/>
+                  </a:schemeClr>
+                </a:gs>
+              </a:gsLst>
+              <a:lin ang="16200000" scaled="1"/>
+              <a:tileRect/>
+            </a:gradFill>
+            <a:ln>
+              <a:solidFill>
                 <a:schemeClr val="accent4">
-                  <a:lumMod val="67000"/>
+                  <a:lumMod val="75000"/>
                 </a:schemeClr>
-              </a:gs>
-              <a:gs pos="48000">
-                <a:schemeClr val="accent4">
-                  <a:lumMod val="97000"/>
-                  <a:lumOff val="3000"/>
-                </a:schemeClr>
-              </a:gs>
-              <a:gs pos="100000">
-                <a:schemeClr val="accent4">
-                  <a:lumMod val="60000"/>
-                  <a:lumOff val="40000"/>
-                </a:schemeClr>
-              </a:gs>
-            </a:gsLst>
-            <a:lin ang="16200000" scaled="1"/>
-            <a:tileRect/>
-          </a:gradFill>
-          <a:ln>
+              </a:solidFill>
+            </a:ln>
+          </p:spPr>
+          <p:style>
+            <a:lnRef idx="0">
+              <a:scrgbClr r="0" g="0" b="0"/>
+            </a:lnRef>
+            <a:fillRef idx="0">
+              <a:scrgbClr r="0" g="0" b="0"/>
+            </a:fillRef>
+            <a:effectRef idx="0">
+              <a:scrgbClr r="0" g="0" b="0"/>
+            </a:effectRef>
+            <a:fontRef idx="minor">
+              <a:schemeClr val="lt1"/>
+            </a:fontRef>
+          </p:style>
+          <p:txBody>
+            <a:bodyPr rot="0" spcFirstLastPara="0" vertOverflow="overflow" horzOverflow="overflow" vert="horz" wrap="square" lIns="48947" tIns="24473" rIns="48947" bIns="24473" numCol="1" spcCol="0" rtlCol="0" fromWordArt="0" anchor="ctr" anchorCtr="0" forceAA="0" compatLnSpc="1">
+              <a:prstTxWarp prst="textNoShape">
+                <a:avLst/>
+              </a:prstTxWarp>
+              <a:noAutofit/>
+            </a:bodyPr>
+            <a:lstStyle/>
+            <a:p>
+              <a:pPr algn="ctr"/>
+              <a:r>
+                <a:rPr lang="en-US" sz="1100" dirty="0"/>
+                <a:t>DB</a:t>
+              </a:r>
+              <a:endParaRPr lang="tr-TR" sz="1100" dirty="0"/>
+            </a:p>
+          </p:txBody>
+        </p:sp>
+        <p:sp>
+          <p:nvSpPr>
+            <p:cNvPr id="18" name="Arrow: Right 17">
+              <a:extLst>
+                <a:ext uri="{FF2B5EF4-FFF2-40B4-BE49-F238E27FC236}">
+                  <a16:creationId xmlns:a16="http://schemas.microsoft.com/office/drawing/2014/main" id="{83D93DA3-9A15-4669-8D56-31D7A69E087B}"/>
+                </a:ext>
+              </a:extLst>
+            </p:cNvPr>
+            <p:cNvSpPr/>
+            <p:nvPr/>
+          </p:nvSpPr>
+          <p:spPr>
+            <a:xfrm>
+              <a:off x="2059973" y="568441"/>
+              <a:ext cx="1204361" cy="253862"/>
+            </a:xfrm>
+            <a:prstGeom prst="rightArrow">
+              <a:avLst/>
+            </a:prstGeom>
+          </p:spPr>
+          <p:style>
+            <a:lnRef idx="2">
+              <a:schemeClr val="accent2">
+                <a:shade val="50000"/>
+              </a:schemeClr>
+            </a:lnRef>
+            <a:fillRef idx="1">
+              <a:schemeClr val="accent2"/>
+            </a:fillRef>
+            <a:effectRef idx="0">
+              <a:schemeClr val="accent2"/>
+            </a:effectRef>
+            <a:fontRef idx="minor">
+              <a:schemeClr val="lt1"/>
+            </a:fontRef>
+          </p:style>
+          <p:txBody>
+            <a:bodyPr rot="0" spcFirstLastPara="0" vertOverflow="overflow" horzOverflow="overflow" vert="horz" wrap="square" lIns="48947" tIns="24473" rIns="48947" bIns="24473" numCol="1" spcCol="0" rtlCol="0" fromWordArt="0" anchor="ctr" anchorCtr="0" forceAA="0" compatLnSpc="1">
+              <a:prstTxWarp prst="textNoShape">
+                <a:avLst/>
+              </a:prstTxWarp>
+              <a:noAutofit/>
+            </a:bodyPr>
+            <a:lstStyle/>
+            <a:p>
+              <a:pPr algn="ctr"/>
+              <a:r>
+                <a:rPr lang="en-US" sz="1100" dirty="0"/>
+                <a:t>Http request</a:t>
+              </a:r>
+              <a:endParaRPr lang="tr-TR" sz="1100" dirty="0"/>
+            </a:p>
+          </p:txBody>
+        </p:sp>
+        <p:sp>
+          <p:nvSpPr>
+            <p:cNvPr id="19" name="Arrow: Left 18">
+              <a:extLst>
+                <a:ext uri="{FF2B5EF4-FFF2-40B4-BE49-F238E27FC236}">
+                  <a16:creationId xmlns:a16="http://schemas.microsoft.com/office/drawing/2014/main" id="{D2A158B3-AD1C-44BE-A119-408E59368116}"/>
+                </a:ext>
+              </a:extLst>
+            </p:cNvPr>
+            <p:cNvSpPr/>
+            <p:nvPr/>
+          </p:nvSpPr>
+          <p:spPr>
+            <a:xfrm>
+              <a:off x="2059973" y="877581"/>
+              <a:ext cx="1204361" cy="253862"/>
+            </a:xfrm>
+            <a:prstGeom prst="leftArrow">
+              <a:avLst/>
+            </a:prstGeom>
+          </p:spPr>
+          <p:style>
+            <a:lnRef idx="2">
+              <a:schemeClr val="accent2">
+                <a:shade val="50000"/>
+              </a:schemeClr>
+            </a:lnRef>
+            <a:fillRef idx="1">
+              <a:schemeClr val="accent2"/>
+            </a:fillRef>
+            <a:effectRef idx="0">
+              <a:schemeClr val="accent2"/>
+            </a:effectRef>
+            <a:fontRef idx="minor">
+              <a:schemeClr val="lt1"/>
+            </a:fontRef>
+          </p:style>
+          <p:txBody>
+            <a:bodyPr rot="0" spcFirstLastPara="0" vertOverflow="overflow" horzOverflow="overflow" vert="horz" wrap="square" lIns="48947" tIns="24473" rIns="48947" bIns="24473" numCol="1" spcCol="0" rtlCol="0" fromWordArt="0" anchor="ctr" anchorCtr="0" forceAA="0" compatLnSpc="1">
+              <a:prstTxWarp prst="textNoShape">
+                <a:avLst/>
+              </a:prstTxWarp>
+              <a:noAutofit/>
+            </a:bodyPr>
+            <a:lstStyle/>
+            <a:p>
+              <a:pPr algn="ctr"/>
+              <a:r>
+                <a:rPr lang="en-US" sz="1100" dirty="0"/>
+                <a:t>Http response</a:t>
+              </a:r>
+              <a:endParaRPr lang="tr-TR" sz="1100" dirty="0"/>
+            </a:p>
+          </p:txBody>
+        </p:sp>
+        <p:cxnSp>
+          <p:nvCxnSpPr>
+            <p:cNvPr id="21" name="Straight Arrow Connector 20">
+              <a:extLst>
+                <a:ext uri="{FF2B5EF4-FFF2-40B4-BE49-F238E27FC236}">
+                  <a16:creationId xmlns:a16="http://schemas.microsoft.com/office/drawing/2014/main" id="{0C401922-2035-435A-88CD-AA815182BD46}"/>
+                </a:ext>
+              </a:extLst>
+            </p:cNvPr>
+            <p:cNvCxnSpPr>
+              <a:cxnSpLocks/>
+              <a:stCxn id="6" idx="3"/>
+              <a:endCxn id="11" idx="2"/>
+            </p:cNvCxnSpPr>
+            <p:nvPr/>
+          </p:nvCxnSpPr>
+          <p:spPr>
+            <a:xfrm flipV="1">
+              <a:off x="4083609" y="890464"/>
+              <a:ext cx="162620" cy="1341"/>
+            </a:xfrm>
+            <a:prstGeom prst="straightConnector1">
+              <a:avLst/>
+            </a:prstGeom>
+            <a:ln>
+              <a:headEnd type="triangle"/>
+              <a:tailEnd type="triangle"/>
+            </a:ln>
+          </p:spPr>
+          <p:style>
+            <a:lnRef idx="1">
+              <a:schemeClr val="accent1"/>
+            </a:lnRef>
+            <a:fillRef idx="0">
+              <a:schemeClr val="accent1"/>
+            </a:fillRef>
+            <a:effectRef idx="0">
+              <a:schemeClr val="accent1"/>
+            </a:effectRef>
+            <a:fontRef idx="minor">
+              <a:schemeClr val="tx1"/>
+            </a:fontRef>
+          </p:style>
+        </p:cxnSp>
+        <p:sp>
+          <p:nvSpPr>
+            <p:cNvPr id="13" name="Rectangle 12">
+              <a:extLst>
+                <a:ext uri="{FF2B5EF4-FFF2-40B4-BE49-F238E27FC236}">
+                  <a16:creationId xmlns:a16="http://schemas.microsoft.com/office/drawing/2014/main" id="{C5FD20E3-7E94-4072-A3AA-F9ECE7F4B1B1}"/>
+                </a:ext>
+              </a:extLst>
+            </p:cNvPr>
+            <p:cNvSpPr/>
+            <p:nvPr/>
+          </p:nvSpPr>
+          <p:spPr>
+            <a:xfrm>
+              <a:off x="1000652" y="1478690"/>
+              <a:ext cx="3082956" cy="344833"/>
+            </a:xfrm>
+            <a:prstGeom prst="rect">
+              <a:avLst/>
+            </a:prstGeom>
             <a:solidFill>
-              <a:schemeClr val="accent4">
-                <a:lumMod val="75000"/>
+              <a:schemeClr val="accent1">
+                <a:lumMod val="40000"/>
+                <a:lumOff val="60000"/>
               </a:schemeClr>
             </a:solidFill>
-          </a:ln>
-        </p:spPr>
-        <p:style>
-          <a:lnRef idx="0">
-            <a:scrgbClr r="0" g="0" b="0"/>
-          </a:lnRef>
-          <a:fillRef idx="0">
-            <a:scrgbClr r="0" g="0" b="0"/>
-          </a:fillRef>
-          <a:effectRef idx="0">
-            <a:scrgbClr r="0" g="0" b="0"/>
-          </a:effectRef>
-          <a:fontRef idx="minor">
-            <a:schemeClr val="lt1"/>
-          </a:fontRef>
-        </p:style>
-        <p:txBody>
-          <a:bodyPr rot="0" spcFirstLastPara="0" vertOverflow="overflow" horzOverflow="overflow" vert="horz" wrap="square" lIns="91440" tIns="45719" rIns="91440" bIns="45719" numCol="1" spcCol="0" rtlCol="0" fromWordArt="0" anchor="ctr" anchorCtr="0" forceAA="0" compatLnSpc="1">
-            <a:prstTxWarp prst="textNoShape">
+            <a:ln>
+              <a:solidFill>
+                <a:schemeClr val="accent1">
+                  <a:lumMod val="20000"/>
+                  <a:lumOff val="80000"/>
+                </a:schemeClr>
+              </a:solidFill>
+            </a:ln>
+          </p:spPr>
+          <p:style>
+            <a:lnRef idx="2">
+              <a:schemeClr val="accent1">
+                <a:shade val="50000"/>
+              </a:schemeClr>
+            </a:lnRef>
+            <a:fillRef idx="1">
+              <a:schemeClr val="accent1"/>
+            </a:fillRef>
+            <a:effectRef idx="0">
+              <a:schemeClr val="accent1"/>
+            </a:effectRef>
+            <a:fontRef idx="minor">
+              <a:schemeClr val="lt1"/>
+            </a:fontRef>
+          </p:style>
+          <p:txBody>
+            <a:bodyPr rot="0" spcFirstLastPara="0" vertOverflow="overflow" horzOverflow="overflow" vert="horz" wrap="square" lIns="48947" tIns="24473" rIns="48947" bIns="24473" numCol="1" spcCol="0" rtlCol="0" fromWordArt="0" anchor="ctr" anchorCtr="0" forceAA="0" compatLnSpc="1">
+              <a:prstTxWarp prst="textNoShape">
+                <a:avLst/>
+              </a:prstTxWarp>
+              <a:noAutofit/>
+            </a:bodyPr>
+            <a:lstStyle/>
+            <a:p>
+              <a:pPr algn="ctr"/>
+              <a:r>
+                <a:rPr lang="en-US" sz="1100" dirty="0"/>
+                <a:t>Domain </a:t>
+              </a:r>
+              <a:r>
+                <a:rPr lang="en-US" sz="1100" dirty="0"/>
+                <a:t>(models, interfaces, etc.)</a:t>
+              </a:r>
+              <a:endParaRPr lang="tr-TR" sz="1100" dirty="0"/>
+            </a:p>
+          </p:txBody>
+        </p:sp>
+        <p:cxnSp>
+          <p:nvCxnSpPr>
+            <p:cNvPr id="20" name="Straight Arrow Connector 19">
+              <a:extLst>
+                <a:ext uri="{FF2B5EF4-FFF2-40B4-BE49-F238E27FC236}">
+                  <a16:creationId xmlns:a16="http://schemas.microsoft.com/office/drawing/2014/main" id="{A1A1A3D5-2712-4757-8CA8-35AFC7A9B3B4}"/>
+                </a:ext>
+              </a:extLst>
+            </p:cNvPr>
+            <p:cNvCxnSpPr>
+              <a:cxnSpLocks/>
+              <a:stCxn id="5" idx="2"/>
+              <a:endCxn id="8" idx="3"/>
+            </p:cNvCxnSpPr>
+            <p:nvPr/>
+          </p:nvCxnSpPr>
+          <p:spPr>
+            <a:xfrm flipH="1" flipV="1">
+              <a:off x="1500786" y="891804"/>
+              <a:ext cx="155588" cy="1"/>
+            </a:xfrm>
+            <a:prstGeom prst="straightConnector1">
               <a:avLst/>
-            </a:prstTxWarp>
-            <a:noAutofit/>
-          </a:bodyPr>
-          <a:lstStyle/>
-          <a:p>
-            <a:pPr algn="ctr"/>
-            <a:r>
-              <a:rPr lang="en-US" sz="1165" dirty="0"/>
-              <a:t>DB</a:t>
-            </a:r>
-            <a:endParaRPr lang="tr-TR" sz="1165" dirty="0"/>
-          </a:p>
-        </p:txBody>
-      </p:sp>
-      <p:sp>
-        <p:nvSpPr>
-          <p:cNvPr id="18" name="Arrow: Right 17">
-            <a:extLst>
-              <a:ext uri="{FF2B5EF4-FFF2-40B4-BE49-F238E27FC236}">
-                <a16:creationId xmlns:a16="http://schemas.microsoft.com/office/drawing/2014/main" id="{83D93DA3-9A15-4669-8D56-31D7A69E087B}"/>
-              </a:ext>
-            </a:extLst>
-          </p:cNvPr>
-          <p:cNvSpPr/>
-          <p:nvPr/>
-        </p:nvSpPr>
-        <p:spPr>
-          <a:xfrm>
-            <a:off x="2401861" y="1196738"/>
-            <a:ext cx="2249904" cy="474249"/>
-          </a:xfrm>
-          <a:prstGeom prst="rightArrow">
-            <a:avLst/>
-          </a:prstGeom>
-        </p:spPr>
-        <p:style>
-          <a:lnRef idx="2">
-            <a:schemeClr val="accent2">
-              <a:shade val="50000"/>
-            </a:schemeClr>
-          </a:lnRef>
-          <a:fillRef idx="1">
-            <a:schemeClr val="accent2"/>
-          </a:fillRef>
-          <a:effectRef idx="0">
-            <a:schemeClr val="accent2"/>
-          </a:effectRef>
-          <a:fontRef idx="minor">
-            <a:schemeClr val="lt1"/>
-          </a:fontRef>
-        </p:style>
-        <p:txBody>
-          <a:bodyPr rot="0" spcFirstLastPara="0" vertOverflow="overflow" horzOverflow="overflow" vert="horz" wrap="square" lIns="91440" tIns="45719" rIns="91440" bIns="45719" numCol="1" spcCol="0" rtlCol="0" fromWordArt="0" anchor="ctr" anchorCtr="0" forceAA="0" compatLnSpc="1">
-            <a:prstTxWarp prst="textNoShape">
+            </a:prstGeom>
+            <a:ln>
+              <a:headEnd type="triangle"/>
+              <a:tailEnd type="triangle"/>
+            </a:ln>
+          </p:spPr>
+          <p:style>
+            <a:lnRef idx="1">
+              <a:schemeClr val="accent1"/>
+            </a:lnRef>
+            <a:fillRef idx="0">
+              <a:schemeClr val="accent1"/>
+            </a:fillRef>
+            <a:effectRef idx="0">
+              <a:schemeClr val="accent1"/>
+            </a:effectRef>
+            <a:fontRef idx="minor">
+              <a:schemeClr val="tx1"/>
+            </a:fontRef>
+          </p:style>
+        </p:cxnSp>
+        <p:cxnSp>
+          <p:nvCxnSpPr>
+            <p:cNvPr id="22" name="Straight Connector 21">
+              <a:extLst>
+                <a:ext uri="{FF2B5EF4-FFF2-40B4-BE49-F238E27FC236}">
+                  <a16:creationId xmlns:a16="http://schemas.microsoft.com/office/drawing/2014/main" id="{31088270-AB12-4405-A1CB-87D2FBAC6CC5}"/>
+                </a:ext>
+              </a:extLst>
+            </p:cNvPr>
+            <p:cNvCxnSpPr>
+              <a:cxnSpLocks/>
+              <a:stCxn id="8" idx="2"/>
+            </p:cNvCxnSpPr>
+            <p:nvPr/>
+          </p:nvCxnSpPr>
+          <p:spPr>
+            <a:xfrm>
+              <a:off x="1250719" y="1308824"/>
+              <a:ext cx="0" cy="169866"/>
+            </a:xfrm>
+            <a:prstGeom prst="line">
               <a:avLst/>
-            </a:prstTxWarp>
-            <a:noAutofit/>
-          </a:bodyPr>
-          <a:lstStyle/>
-          <a:p>
-            <a:pPr algn="ctr"/>
-            <a:r>
-              <a:rPr lang="en-US" sz="1100" dirty="0"/>
-              <a:t>Http request</a:t>
-            </a:r>
-            <a:endParaRPr lang="tr-TR" sz="1100" dirty="0"/>
-          </a:p>
-        </p:txBody>
-      </p:sp>
-      <p:sp>
-        <p:nvSpPr>
-          <p:cNvPr id="19" name="Arrow: Left 18">
-            <a:extLst>
-              <a:ext uri="{FF2B5EF4-FFF2-40B4-BE49-F238E27FC236}">
-                <a16:creationId xmlns:a16="http://schemas.microsoft.com/office/drawing/2014/main" id="{D2A158B3-AD1C-44BE-A119-408E59368116}"/>
-              </a:ext>
-            </a:extLst>
-          </p:cNvPr>
-          <p:cNvSpPr/>
-          <p:nvPr/>
-        </p:nvSpPr>
-        <p:spPr>
-          <a:xfrm>
-            <a:off x="2401861" y="1774252"/>
-            <a:ext cx="2249904" cy="474249"/>
-          </a:xfrm>
-          <a:prstGeom prst="leftArrow">
-            <a:avLst/>
-          </a:prstGeom>
-        </p:spPr>
-        <p:style>
-          <a:lnRef idx="2">
-            <a:schemeClr val="accent2">
-              <a:shade val="50000"/>
-            </a:schemeClr>
-          </a:lnRef>
-          <a:fillRef idx="1">
-            <a:schemeClr val="accent2"/>
-          </a:fillRef>
-          <a:effectRef idx="0">
-            <a:schemeClr val="accent2"/>
-          </a:effectRef>
-          <a:fontRef idx="minor">
-            <a:schemeClr val="lt1"/>
-          </a:fontRef>
-        </p:style>
-        <p:txBody>
-          <a:bodyPr rot="0" spcFirstLastPara="0" vertOverflow="overflow" horzOverflow="overflow" vert="horz" wrap="square" lIns="91440" tIns="45719" rIns="91440" bIns="45719" numCol="1" spcCol="0" rtlCol="0" fromWordArt="0" anchor="ctr" anchorCtr="0" forceAA="0" compatLnSpc="1">
-            <a:prstTxWarp prst="textNoShape">
+            </a:prstGeom>
+          </p:spPr>
+          <p:style>
+            <a:lnRef idx="1">
+              <a:schemeClr val="accent1"/>
+            </a:lnRef>
+            <a:fillRef idx="0">
+              <a:schemeClr val="accent1"/>
+            </a:fillRef>
+            <a:effectRef idx="0">
+              <a:schemeClr val="accent1"/>
+            </a:effectRef>
+            <a:fontRef idx="minor">
+              <a:schemeClr val="tx1"/>
+            </a:fontRef>
+          </p:style>
+        </p:cxnSp>
+        <p:cxnSp>
+          <p:nvCxnSpPr>
+            <p:cNvPr id="25" name="Straight Connector 24">
+              <a:extLst>
+                <a:ext uri="{FF2B5EF4-FFF2-40B4-BE49-F238E27FC236}">
+                  <a16:creationId xmlns:a16="http://schemas.microsoft.com/office/drawing/2014/main" id="{26CABAA3-660C-4067-83A6-1C5621F95B0D}"/>
+                </a:ext>
+              </a:extLst>
+            </p:cNvPr>
+            <p:cNvCxnSpPr>
+              <a:cxnSpLocks/>
+            </p:cNvCxnSpPr>
+            <p:nvPr/>
+          </p:nvCxnSpPr>
+          <p:spPr>
+            <a:xfrm>
+              <a:off x="3728676" y="1308823"/>
+              <a:ext cx="0" cy="169866"/>
+            </a:xfrm>
+            <a:prstGeom prst="line">
               <a:avLst/>
-            </a:prstTxWarp>
-            <a:noAutofit/>
-          </a:bodyPr>
-          <a:lstStyle/>
-          <a:p>
-            <a:pPr algn="ctr"/>
-            <a:r>
-              <a:rPr lang="en-US" sz="1100" dirty="0"/>
-              <a:t>Http response</a:t>
-            </a:r>
-            <a:endParaRPr lang="tr-TR" sz="1100" dirty="0"/>
-          </a:p>
-        </p:txBody>
-      </p:sp>
-      <p:cxnSp>
-        <p:nvCxnSpPr>
-          <p:cNvPr id="21" name="Straight Arrow Connector 20">
-            <a:extLst>
-              <a:ext uri="{FF2B5EF4-FFF2-40B4-BE49-F238E27FC236}">
-                <a16:creationId xmlns:a16="http://schemas.microsoft.com/office/drawing/2014/main" id="{0C401922-2035-435A-88CD-AA815182BD46}"/>
-              </a:ext>
-            </a:extLst>
-          </p:cNvPr>
-          <p:cNvCxnSpPr>
-            <a:cxnSpLocks/>
-            <a:stCxn id="6" idx="3"/>
-            <a:endCxn id="11" idx="2"/>
-          </p:cNvCxnSpPr>
-          <p:nvPr/>
-        </p:nvCxnSpPr>
-        <p:spPr>
-          <a:xfrm flipV="1">
-            <a:off x="6182280" y="1741169"/>
-            <a:ext cx="303795" cy="19052"/>
-          </a:xfrm>
-          <a:prstGeom prst="straightConnector1">
-            <a:avLst/>
-          </a:prstGeom>
-          <a:ln>
-            <a:headEnd type="triangle"/>
-            <a:tailEnd type="triangle"/>
-          </a:ln>
-        </p:spPr>
-        <p:style>
-          <a:lnRef idx="1">
-            <a:schemeClr val="accent1"/>
-          </a:lnRef>
-          <a:fillRef idx="0">
-            <a:schemeClr val="accent1"/>
-          </a:fillRef>
-          <a:effectRef idx="0">
-            <a:schemeClr val="accent1"/>
-          </a:effectRef>
-          <a:fontRef idx="minor">
-            <a:schemeClr val="tx1"/>
-          </a:fontRef>
-        </p:style>
-      </p:cxnSp>
-      <p:sp>
-        <p:nvSpPr>
-          <p:cNvPr id="13" name="Rectangle 12">
-            <a:extLst>
-              <a:ext uri="{FF2B5EF4-FFF2-40B4-BE49-F238E27FC236}">
-                <a16:creationId xmlns:a16="http://schemas.microsoft.com/office/drawing/2014/main" id="{C5FD20E3-7E94-4072-A3AA-F9ECE7F4B1B1}"/>
-              </a:ext>
-            </a:extLst>
-          </p:cNvPr>
-          <p:cNvSpPr/>
-          <p:nvPr/>
-        </p:nvSpPr>
-        <p:spPr>
-          <a:xfrm>
-            <a:off x="422910" y="3649677"/>
-            <a:ext cx="5759369" cy="644193"/>
-          </a:xfrm>
-          <a:prstGeom prst="rect">
-            <a:avLst/>
-          </a:prstGeom>
-          <a:solidFill>
-            <a:schemeClr val="accent1">
-              <a:lumMod val="40000"/>
-              <a:lumOff val="60000"/>
-            </a:schemeClr>
-          </a:solidFill>
-          <a:ln>
-            <a:solidFill>
-              <a:schemeClr val="accent1">
-                <a:lumMod val="20000"/>
-                <a:lumOff val="80000"/>
-              </a:schemeClr>
-            </a:solidFill>
-          </a:ln>
-        </p:spPr>
-        <p:style>
-          <a:lnRef idx="2">
-            <a:schemeClr val="accent1">
-              <a:shade val="50000"/>
-            </a:schemeClr>
-          </a:lnRef>
-          <a:fillRef idx="1">
-            <a:schemeClr val="accent1"/>
-          </a:fillRef>
-          <a:effectRef idx="0">
-            <a:schemeClr val="accent1"/>
-          </a:effectRef>
-          <a:fontRef idx="minor">
-            <a:schemeClr val="lt1"/>
-          </a:fontRef>
-        </p:style>
-        <p:txBody>
-          <a:bodyPr rot="0" spcFirstLastPara="0" vertOverflow="overflow" horzOverflow="overflow" vert="horz" wrap="square" lIns="91440" tIns="45719" rIns="91440" bIns="45719" numCol="1" spcCol="0" rtlCol="0" fromWordArt="0" anchor="ctr" anchorCtr="0" forceAA="0" compatLnSpc="1">
-            <a:prstTxWarp prst="textNoShape">
-              <a:avLst/>
-            </a:prstTxWarp>
-            <a:noAutofit/>
-          </a:bodyPr>
-          <a:lstStyle/>
-          <a:p>
-            <a:pPr algn="ctr"/>
-            <a:r>
-              <a:rPr lang="en-US" sz="1165" dirty="0"/>
-              <a:t>Infrastructure (models, interfaces, etc.)</a:t>
-            </a:r>
-            <a:endParaRPr lang="tr-TR" sz="1165" dirty="0"/>
-          </a:p>
-        </p:txBody>
-      </p:sp>
-      <p:cxnSp>
-        <p:nvCxnSpPr>
-          <p:cNvPr id="20" name="Straight Arrow Connector 19">
-            <a:extLst>
-              <a:ext uri="{FF2B5EF4-FFF2-40B4-BE49-F238E27FC236}">
-                <a16:creationId xmlns:a16="http://schemas.microsoft.com/office/drawing/2014/main" id="{A1A1A3D5-2712-4757-8CA8-35AFC7A9B3B4}"/>
-              </a:ext>
-            </a:extLst>
-          </p:cNvPr>
-          <p:cNvCxnSpPr>
-            <a:cxnSpLocks/>
-            <a:stCxn id="5" idx="2"/>
-            <a:endCxn id="8" idx="3"/>
-          </p:cNvCxnSpPr>
-          <p:nvPr/>
-        </p:nvCxnSpPr>
-        <p:spPr>
-          <a:xfrm flipH="1" flipV="1">
-            <a:off x="1357227" y="1760219"/>
-            <a:ext cx="290658" cy="2"/>
-          </a:xfrm>
-          <a:prstGeom prst="straightConnector1">
-            <a:avLst/>
-          </a:prstGeom>
-          <a:ln>
-            <a:headEnd type="triangle"/>
-            <a:tailEnd type="triangle"/>
-          </a:ln>
-        </p:spPr>
-        <p:style>
-          <a:lnRef idx="1">
-            <a:schemeClr val="accent1"/>
-          </a:lnRef>
-          <a:fillRef idx="0">
-            <a:schemeClr val="accent1"/>
-          </a:fillRef>
-          <a:effectRef idx="0">
-            <a:schemeClr val="accent1"/>
-          </a:effectRef>
-          <a:fontRef idx="minor">
-            <a:schemeClr val="tx1"/>
-          </a:fontRef>
-        </p:style>
-      </p:cxnSp>
-      <p:cxnSp>
-        <p:nvCxnSpPr>
-          <p:cNvPr id="22" name="Straight Connector 21">
-            <a:extLst>
-              <a:ext uri="{FF2B5EF4-FFF2-40B4-BE49-F238E27FC236}">
-                <a16:creationId xmlns:a16="http://schemas.microsoft.com/office/drawing/2014/main" id="{31088270-AB12-4405-A1CB-87D2FBAC6CC5}"/>
-              </a:ext>
-            </a:extLst>
-          </p:cNvPr>
-          <p:cNvCxnSpPr>
-            <a:cxnSpLocks/>
-            <a:stCxn id="8" idx="2"/>
-          </p:cNvCxnSpPr>
-          <p:nvPr/>
-        </p:nvCxnSpPr>
-        <p:spPr>
-          <a:xfrm>
-            <a:off x="890069" y="3332345"/>
-            <a:ext cx="0" cy="317332"/>
-          </a:xfrm>
-          <a:prstGeom prst="line">
-            <a:avLst/>
-          </a:prstGeom>
-        </p:spPr>
-        <p:style>
-          <a:lnRef idx="1">
-            <a:schemeClr val="accent1"/>
-          </a:lnRef>
-          <a:fillRef idx="0">
-            <a:schemeClr val="accent1"/>
-          </a:fillRef>
-          <a:effectRef idx="0">
-            <a:schemeClr val="accent1"/>
-          </a:effectRef>
-          <a:fontRef idx="minor">
-            <a:schemeClr val="tx1"/>
-          </a:fontRef>
-        </p:style>
-      </p:cxnSp>
-      <p:cxnSp>
-        <p:nvCxnSpPr>
-          <p:cNvPr id="25" name="Straight Connector 24">
-            <a:extLst>
-              <a:ext uri="{FF2B5EF4-FFF2-40B4-BE49-F238E27FC236}">
-                <a16:creationId xmlns:a16="http://schemas.microsoft.com/office/drawing/2014/main" id="{26CABAA3-660C-4067-83A6-1C5621F95B0D}"/>
-              </a:ext>
-            </a:extLst>
-          </p:cNvPr>
-          <p:cNvCxnSpPr>
-            <a:cxnSpLocks/>
-          </p:cNvCxnSpPr>
-          <p:nvPr/>
-        </p:nvCxnSpPr>
-        <p:spPr>
-          <a:xfrm>
-            <a:off x="5519219" y="3332345"/>
-            <a:ext cx="0" cy="317332"/>
-          </a:xfrm>
-          <a:prstGeom prst="line">
-            <a:avLst/>
-          </a:prstGeom>
-        </p:spPr>
-        <p:style>
-          <a:lnRef idx="1">
-            <a:schemeClr val="accent1"/>
-          </a:lnRef>
-          <a:fillRef idx="0">
-            <a:schemeClr val="accent1"/>
-          </a:fillRef>
-          <a:effectRef idx="0">
-            <a:schemeClr val="accent1"/>
-          </a:effectRef>
-          <a:fontRef idx="minor">
-            <a:schemeClr val="tx1"/>
-          </a:fontRef>
-        </p:style>
-      </p:cxnSp>
+            </a:prstGeom>
+          </p:spPr>
+          <p:style>
+            <a:lnRef idx="1">
+              <a:schemeClr val="accent1"/>
+            </a:lnRef>
+            <a:fillRef idx="0">
+              <a:schemeClr val="accent1"/>
+            </a:fillRef>
+            <a:effectRef idx="0">
+              <a:schemeClr val="accent1"/>
+            </a:effectRef>
+            <a:fontRef idx="minor">
+              <a:schemeClr val="tx1"/>
+            </a:fontRef>
+          </p:style>
+        </p:cxnSp>
+      </p:grpSp>
     </p:spTree>
     <p:extLst>
       <p:ext uri="{BB962C8B-B14F-4D97-AF65-F5344CB8AC3E}">
@@ -4036,6 +4060,13 @@
   <p:clrMapOvr>
     <a:masterClrMapping/>
   </p:clrMapOvr>
+  <p:timing>
+    <p:tnLst>
+      <p:par>
+        <p:cTn id="1" dur="indefinite" restart="never" nodeType="tmRoot"/>
+      </p:par>
+    </p:tnLst>
+  </p:timing>
 </p:sld>
 </file>
 
@@ -4056,7 +4087,7 @@
         <a:srgbClr val="E7E6E6"/>
       </a:lt2>
       <a:accent1>
-        <a:srgbClr val="4472C4"/>
+        <a:srgbClr val="5B9BD5"/>
       </a:accent1>
       <a:accent2>
         <a:srgbClr val="ED7D31"/>
@@ -4068,7 +4099,7 @@
         <a:srgbClr val="FFC000"/>
       </a:accent4>
       <a:accent5>
-        <a:srgbClr val="5B9BD5"/>
+        <a:srgbClr val="4472C4"/>
       </a:accent5>
       <a:accent6>
         <a:srgbClr val="70AD47"/>

</xml_diff>